<commit_message>
fix alt text in ppt, wsd guides
</commit_message>
<xml_diff>
--- a/Whiteboard design session/WDS trainer presentation - Containers and DevOps.pptx
+++ b/Whiteboard design session/WDS trainer presentation - Containers and DevOps.pptx
@@ -221,7 +221,7 @@
           <a:p>
             <a:fld id="{52A13B17-C506-4D51-BB37-16B365906619}" type="datetimeFigureOut">
               <a:rPr lang="en-US" smtClean="0"/>
-              <a:t>6/29/2018</a:t>
+              <a:t>7/2/2018</a:t>
             </a:fld>
             <a:endParaRPr lang="en-US"/>
           </a:p>
@@ -2177,7 +2177,7 @@
                   <a:prstClr val="black"/>
                 </a:solidFill>
               </a:rPr>
-              <a:t>6/29/2018 1:50 PM</a:t>
+              <a:t>7/2/2018 11:20 PM</a:t>
             </a:fld>
             <a:endParaRPr lang="en-US" dirty="0">
               <a:solidFill>
@@ -15804,7 +15804,7 @@
       </p:sp>
       <p:pic>
         <p:nvPicPr>
-          <p:cNvPr id="5" name="Picture 4" descr="Azure Container Service configured to use Kubernetes." title="Azure container service (AKS) to configure Kubernetes">
+          <p:cNvPr id="5" name="Picture 4" descr="A diagram of a Kubernetes cluster topology illustrating master and agent nodes with load balancers. ">
             <a:extLst>
               <a:ext uri="{FF2B5EF4-FFF2-40B4-BE49-F238E27FC236}">
                 <a16:creationId xmlns:a16="http://schemas.microsoft.com/office/drawing/2014/main" id="{7AEFFEC0-5207-4451-B522-B0D07BE0B68B}"/>
@@ -15956,7 +15956,7 @@
       </p:sp>
       <p:pic>
         <p:nvPicPr>
-          <p:cNvPr id="1026" name="Picture 2" descr="VSTS DevOps workflow with Azure Kubernetes Service">
+          <p:cNvPr id="1026" name="Picture 2" descr="A diagram showing the VSTS DevOps workflow to build Docker images from source code, push images to Azure Container Registry, and deploy to Azure Container Service using Kubernetes, Swarm or DCOS).">
             <a:extLst>
               <a:ext uri="{FF2B5EF4-FFF2-40B4-BE49-F238E27FC236}">
                 <a16:creationId xmlns:a16="http://schemas.microsoft.com/office/drawing/2014/main" id="{D848FBB8-DB5E-48C8-9111-518DF8FB2F55}"/>
@@ -17725,7 +17725,7 @@
       </p:sp>
       <p:pic>
         <p:nvPicPr>
-          <p:cNvPr id="4" name="Picture 3">
+          <p:cNvPr id="4" name="Picture 3" descr="A diagram showing the solution, using Azure Kubernetes Service with a CosmosDB back end.">
             <a:extLst>
               <a:ext uri="{FF2B5EF4-FFF2-40B4-BE49-F238E27FC236}">
                 <a16:creationId xmlns:a16="http://schemas.microsoft.com/office/drawing/2014/main" id="{A77DE13A-AD2C-4759-A6A4-111012127BDB}"/>
@@ -20223,6 +20223,24 @@
 </file>
 
 <file path=customXml/item1.xml><?xml version="1.0" encoding="utf-8"?>
+<?mso-contentType ?>
+<FormTemplates xmlns="http://schemas.microsoft.com/sharepoint/v3/contenttype/forms">
+  <Display>DocumentLibraryForm</Display>
+  <Edit>DocumentLibraryForm</Edit>
+  <New>DocumentLibraryForm</New>
+</FormTemplates>
+</file>
+
+<file path=customXml/item2.xml><?xml version="1.0" encoding="utf-8"?>
+<p:properties xmlns:p="http://schemas.microsoft.com/office/2006/metadata/properties" xmlns:xsi="http://www.w3.org/2001/XMLSchema-instance" xmlns:pc="http://schemas.microsoft.com/office/infopath/2007/PartnerControls">
+  <documentManagement>
+    <_ip_UnifiedCompliancePolicyUIAction xmlns="http://schemas.microsoft.com/sharepoint/v3" xsi:nil="true"/>
+    <_ip_UnifiedCompliancePolicyProperties xmlns="http://schemas.microsoft.com/sharepoint/v3" xsi:nil="true"/>
+  </documentManagement>
+</p:properties>
+</file>
+
+<file path=customXml/item3.xml><?xml version="1.0" encoding="utf-8"?>
 <ct:contentTypeSchema xmlns:ct="http://schemas.microsoft.com/office/2006/metadata/contentType" xmlns:ma="http://schemas.microsoft.com/office/2006/metadata/properties/metaAttributes" ct:_="" ma:_="" ma:contentTypeName="Document" ma:contentTypeID="0x010100D15DFA3690A15B4081582BBCC6BEAC3E" ma:contentTypeVersion="9" ma:contentTypeDescription="Create a new document." ma:contentTypeScope="" ma:versionID="642da1784587cbe85a7fdbbe4dc36103">
   <xsd:schema xmlns:xsd="http://www.w3.org/2001/XMLSchema" xmlns:xs="http://www.w3.org/2001/XMLSchema" xmlns:p="http://schemas.microsoft.com/office/2006/metadata/properties" xmlns:ns1="http://schemas.microsoft.com/sharepoint/v3" xmlns:ns2="2023ac63-7b75-4916-a9ee-591457758eee" xmlns:ns3="d9c797ad-d7c3-4982-82b7-81352a75e4a5" targetNamespace="http://schemas.microsoft.com/office/2006/metadata/properties" ma:root="true" ma:fieldsID="91198b0246576053cc55dd2c67035a89" ns1:_="" ns2:_="" ns3:_="">
     <xsd:import namespace="http://schemas.microsoft.com/sharepoint/v3"/>
@@ -20424,40 +20442,10 @@
 </ct:contentTypeSchema>
 </file>
 
-<file path=customXml/item2.xml><?xml version="1.0" encoding="utf-8"?>
-<p:properties xmlns:p="http://schemas.microsoft.com/office/2006/metadata/properties" xmlns:xsi="http://www.w3.org/2001/XMLSchema-instance" xmlns:pc="http://schemas.microsoft.com/office/infopath/2007/PartnerControls">
-  <documentManagement>
-    <_ip_UnifiedCompliancePolicyUIAction xmlns="http://schemas.microsoft.com/sharepoint/v3" xsi:nil="true"/>
-    <_ip_UnifiedCompliancePolicyProperties xmlns="http://schemas.microsoft.com/sharepoint/v3" xsi:nil="true"/>
-  </documentManagement>
-</p:properties>
-</file>
-
-<file path=customXml/item3.xml><?xml version="1.0" encoding="utf-8"?>
-<?mso-contentType ?>
-<FormTemplates xmlns="http://schemas.microsoft.com/sharepoint/v3/contenttype/forms">
-  <Display>DocumentLibraryForm</Display>
-  <Edit>DocumentLibraryForm</Edit>
-  <New>DocumentLibraryForm</New>
-</FormTemplates>
-</file>
-
 <file path=customXml/itemProps1.xml><?xml version="1.0" encoding="utf-8"?>
-<ds:datastoreItem xmlns:ds="http://schemas.openxmlformats.org/officeDocument/2006/customXml" ds:itemID="{7739C07D-175D-4795-BC78-2FBA4DE737F8}">
+<ds:datastoreItem xmlns:ds="http://schemas.openxmlformats.org/officeDocument/2006/customXml" ds:itemID="{158EBE6C-F96B-4BB0-A894-BE91EDC32CEB}">
   <ds:schemaRefs>
-    <ds:schemaRef ds:uri="http://schemas.microsoft.com/office/2006/metadata/contentType"/>
-    <ds:schemaRef ds:uri="http://schemas.microsoft.com/office/2006/metadata/properties/metaAttributes"/>
-    <ds:schemaRef ds:uri="http://www.w3.org/2001/XMLSchema"/>
-    <ds:schemaRef ds:uri="http://schemas.microsoft.com/office/2006/metadata/properties"/>
-    <ds:schemaRef ds:uri="http://schemas.microsoft.com/sharepoint/v3"/>
-    <ds:schemaRef ds:uri="2023ac63-7b75-4916-a9ee-591457758eee"/>
-    <ds:schemaRef ds:uri="d9c797ad-d7c3-4982-82b7-81352a75e4a5"/>
-    <ds:schemaRef ds:uri="http://schemas.microsoft.com/office/2006/documentManagement/types"/>
-    <ds:schemaRef ds:uri="http://schemas.microsoft.com/office/infopath/2007/PartnerControls"/>
-    <ds:schemaRef ds:uri="http://schemas.openxmlformats.org/package/2006/metadata/core-properties"/>
-    <ds:schemaRef ds:uri="http://purl.org/dc/elements/1.1/"/>
-    <ds:schemaRef ds:uri="http://purl.org/dc/terms/"/>
-    <ds:schemaRef ds:uri="http://schemas.microsoft.com/internal/obd"/>
+    <ds:schemaRef ds:uri="http://schemas.microsoft.com/sharepoint/v3/contenttype/forms"/>
   </ds:schemaRefs>
 </ds:datastoreItem>
 </file>
@@ -20481,9 +20469,21 @@
 </file>
 
 <file path=customXml/itemProps3.xml><?xml version="1.0" encoding="utf-8"?>
-<ds:datastoreItem xmlns:ds="http://schemas.openxmlformats.org/officeDocument/2006/customXml" ds:itemID="{158EBE6C-F96B-4BB0-A894-BE91EDC32CEB}">
+<ds:datastoreItem xmlns:ds="http://schemas.openxmlformats.org/officeDocument/2006/customXml" ds:itemID="{7739C07D-175D-4795-BC78-2FBA4DE737F8}">
   <ds:schemaRefs>
-    <ds:schemaRef ds:uri="http://schemas.microsoft.com/sharepoint/v3/contenttype/forms"/>
+    <ds:schemaRef ds:uri="http://schemas.microsoft.com/office/2006/metadata/contentType"/>
+    <ds:schemaRef ds:uri="http://schemas.microsoft.com/office/2006/metadata/properties/metaAttributes"/>
+    <ds:schemaRef ds:uri="http://www.w3.org/2001/XMLSchema"/>
+    <ds:schemaRef ds:uri="http://schemas.microsoft.com/office/2006/metadata/properties"/>
+    <ds:schemaRef ds:uri="http://schemas.microsoft.com/sharepoint/v3"/>
+    <ds:schemaRef ds:uri="2023ac63-7b75-4916-a9ee-591457758eee"/>
+    <ds:schemaRef ds:uri="d9c797ad-d7c3-4982-82b7-81352a75e4a5"/>
+    <ds:schemaRef ds:uri="http://schemas.microsoft.com/office/2006/documentManagement/types"/>
+    <ds:schemaRef ds:uri="http://schemas.microsoft.com/office/infopath/2007/PartnerControls"/>
+    <ds:schemaRef ds:uri="http://schemas.openxmlformats.org/package/2006/metadata/core-properties"/>
+    <ds:schemaRef ds:uri="http://purl.org/dc/elements/1.1/"/>
+    <ds:schemaRef ds:uri="http://purl.org/dc/terms/"/>
+    <ds:schemaRef ds:uri="http://schemas.microsoft.com/internal/obd"/>
   </ds:schemaRefs>
 </ds:datastoreItem>
 </file>
</xml_diff>

<commit_message>
update ppt bullet format
</commit_message>
<xml_diff>
--- a/Whiteboard design session/WDS trainer presentation - Containers and DevOps.pptx
+++ b/Whiteboard design session/WDS trainer presentation - Containers and DevOps.pptx
@@ -2177,7 +2177,7 @@
                   <a:prstClr val="black"/>
                 </a:solidFill>
               </a:rPr>
-              <a:t>8/22/2018 8:52 AM</a:t>
+              <a:t>8/22/2018 10:09 AM</a:t>
             </a:fld>
             <a:endParaRPr lang="en-US" dirty="0">
               <a:solidFill>
@@ -15430,7 +15430,7 @@
               <a:rPr lang="en-US" sz="2800" dirty="0">
                 <a:latin typeface="+mj-lt"/>
               </a:rPr>
-              <a:t>They wish to complete an implementation of the proposed solution for a single tenant to train the team and perfect the process.</a:t>
+              <a:t>They wish to complete an implementation of the proposed solution for a single tenant to train the team and perfect the process</a:t>
             </a:r>
           </a:p>
           <a:p>
@@ -17179,7 +17179,7 @@
             <a:pPr marL="522296" lvl="1" indent="-285750"/>
             <a:r>
               <a:rPr lang="en-US" sz="2800" dirty="0"/>
-              <a:t>The primary audience is the technical strategic decision-maker with influential solution architects, or lead technical personnel in development or operations. </a:t>
+              <a:t>The primary audience is the technical strategic decision-maker with influential solution architects, or lead technical personnel in development or operations </a:t>
             </a:r>
           </a:p>
           <a:p>
@@ -17190,7 +17190,7 @@
             <a:pPr marL="522296" lvl="1" indent="-285750"/>
             <a:r>
               <a:rPr lang="en-US" sz="2800" dirty="0"/>
-              <a:t>Usually we talk to the key architects, developers and infrastructure managers who report to the CIO or equivalent, or to key solution sponsors or those that represent the business unit IT or developers that report to those sponsors.</a:t>
+              <a:t>Usually we talk to the key architects, developers and infrastructure managers who report to the CIO or equivalent, or to key solution sponsors or those that represent the business unit IT or developers that report to those sponsors</a:t>
             </a:r>
           </a:p>
           <a:p>
@@ -17318,7 +17318,7 @@
             </a:r>
             <a:r>
               <a:rPr lang="en-US" sz="3600" dirty="0"/>
-              <a:t> Medical Conferences decided to move forward with Azure Kubernetes Service (AKS).</a:t>
+              <a:t> Medical Conferences decided to move forward with Azure Kubernetes Service (AKS)</a:t>
             </a:r>
           </a:p>
           <a:p>
@@ -17329,7 +17329,7 @@
             <a:pPr lvl="1"/>
             <a:r>
               <a:rPr lang="en-US" sz="3600" dirty="0"/>
-              <a:t>They also decided to move forward with VSTS for infrastructure and container DevOps workflows. </a:t>
+              <a:t>They also decided to move forward with VSTS for infrastructure and container DevOps workflows</a:t>
             </a:r>
           </a:p>
           <a:p>
@@ -18510,7 +18510,7 @@
           <a:p>
             <a:r>
               <a:rPr lang="en-US" sz="3600" b="1" dirty="0"/>
-              <a:t>After starting with a few small conferences, they now have evolved into a well-known brand and handle over 100 conferences per year, and growing. </a:t>
+              <a:t>After starting with a few small conferences, they now have evolved into a well-known brand and handle over 100 conferences per year, and growing </a:t>
             </a:r>
           </a:p>
           <a:p>
@@ -18659,7 +18659,7 @@
           <a:p>
             <a:r>
               <a:rPr lang="en-US" sz="3600" b="1" dirty="0"/>
-              <a:t>These changes can impact various aspects of the system from UI to back end, including conference registration and payment terms. </a:t>
+              <a:t>These changes can impact various aspects of the system from UI to back end, including conference registration and payment terms </a:t>
             </a:r>
           </a:p>
           <a:p>
@@ -20223,6 +20223,24 @@
 </file>
 
 <file path=customXml/item1.xml><?xml version="1.0" encoding="utf-8"?>
+<?mso-contentType ?>
+<FormTemplates xmlns="http://schemas.microsoft.com/sharepoint/v3/contenttype/forms">
+  <Display>DocumentLibraryForm</Display>
+  <Edit>DocumentLibraryForm</Edit>
+  <New>DocumentLibraryForm</New>
+</FormTemplates>
+</file>
+
+<file path=customXml/item2.xml><?xml version="1.0" encoding="utf-8"?>
+<p:properties xmlns:p="http://schemas.microsoft.com/office/2006/metadata/properties" xmlns:xsi="http://www.w3.org/2001/XMLSchema-instance" xmlns:pc="http://schemas.microsoft.com/office/infopath/2007/PartnerControls">
+  <documentManagement>
+    <_ip_UnifiedCompliancePolicyUIAction xmlns="http://schemas.microsoft.com/sharepoint/v3" xsi:nil="true"/>
+    <_ip_UnifiedCompliancePolicyProperties xmlns="http://schemas.microsoft.com/sharepoint/v3" xsi:nil="true"/>
+  </documentManagement>
+</p:properties>
+</file>
+
+<file path=customXml/item3.xml><?xml version="1.0" encoding="utf-8"?>
 <ct:contentTypeSchema xmlns:ct="http://schemas.microsoft.com/office/2006/metadata/contentType" xmlns:ma="http://schemas.microsoft.com/office/2006/metadata/properties/metaAttributes" ct:_="" ma:_="" ma:contentTypeName="Document" ma:contentTypeID="0x010100D15DFA3690A15B4081582BBCC6BEAC3E" ma:contentTypeVersion="9" ma:contentTypeDescription="Create a new document." ma:contentTypeScope="" ma:versionID="642da1784587cbe85a7fdbbe4dc36103">
   <xsd:schema xmlns:xsd="http://www.w3.org/2001/XMLSchema" xmlns:xs="http://www.w3.org/2001/XMLSchema" xmlns:p="http://schemas.microsoft.com/office/2006/metadata/properties" xmlns:ns1="http://schemas.microsoft.com/sharepoint/v3" xmlns:ns2="2023ac63-7b75-4916-a9ee-591457758eee" xmlns:ns3="d9c797ad-d7c3-4982-82b7-81352a75e4a5" targetNamespace="http://schemas.microsoft.com/office/2006/metadata/properties" ma:root="true" ma:fieldsID="91198b0246576053cc55dd2c67035a89" ns1:_="" ns2:_="" ns3:_="">
     <xsd:import namespace="http://schemas.microsoft.com/sharepoint/v3"/>
@@ -20424,40 +20442,10 @@
 </ct:contentTypeSchema>
 </file>
 
-<file path=customXml/item2.xml><?xml version="1.0" encoding="utf-8"?>
-<p:properties xmlns:p="http://schemas.microsoft.com/office/2006/metadata/properties" xmlns:xsi="http://www.w3.org/2001/XMLSchema-instance" xmlns:pc="http://schemas.microsoft.com/office/infopath/2007/PartnerControls">
-  <documentManagement>
-    <_ip_UnifiedCompliancePolicyUIAction xmlns="http://schemas.microsoft.com/sharepoint/v3" xsi:nil="true"/>
-    <_ip_UnifiedCompliancePolicyProperties xmlns="http://schemas.microsoft.com/sharepoint/v3" xsi:nil="true"/>
-  </documentManagement>
-</p:properties>
-</file>
-
-<file path=customXml/item3.xml><?xml version="1.0" encoding="utf-8"?>
-<?mso-contentType ?>
-<FormTemplates xmlns="http://schemas.microsoft.com/sharepoint/v3/contenttype/forms">
-  <Display>DocumentLibraryForm</Display>
-  <Edit>DocumentLibraryForm</Edit>
-  <New>DocumentLibraryForm</New>
-</FormTemplates>
-</file>
-
 <file path=customXml/itemProps1.xml><?xml version="1.0" encoding="utf-8"?>
-<ds:datastoreItem xmlns:ds="http://schemas.openxmlformats.org/officeDocument/2006/customXml" ds:itemID="{7739C07D-175D-4795-BC78-2FBA4DE737F8}">
+<ds:datastoreItem xmlns:ds="http://schemas.openxmlformats.org/officeDocument/2006/customXml" ds:itemID="{158EBE6C-F96B-4BB0-A894-BE91EDC32CEB}">
   <ds:schemaRefs>
-    <ds:schemaRef ds:uri="http://schemas.microsoft.com/office/2006/metadata/contentType"/>
-    <ds:schemaRef ds:uri="http://schemas.microsoft.com/office/2006/metadata/properties/metaAttributes"/>
-    <ds:schemaRef ds:uri="http://www.w3.org/2001/XMLSchema"/>
-    <ds:schemaRef ds:uri="http://schemas.microsoft.com/office/2006/metadata/properties"/>
-    <ds:schemaRef ds:uri="http://schemas.microsoft.com/sharepoint/v3"/>
-    <ds:schemaRef ds:uri="2023ac63-7b75-4916-a9ee-591457758eee"/>
-    <ds:schemaRef ds:uri="d9c797ad-d7c3-4982-82b7-81352a75e4a5"/>
-    <ds:schemaRef ds:uri="http://schemas.microsoft.com/office/2006/documentManagement/types"/>
-    <ds:schemaRef ds:uri="http://schemas.microsoft.com/office/infopath/2007/PartnerControls"/>
-    <ds:schemaRef ds:uri="http://schemas.openxmlformats.org/package/2006/metadata/core-properties"/>
-    <ds:schemaRef ds:uri="http://purl.org/dc/elements/1.1/"/>
-    <ds:schemaRef ds:uri="http://purl.org/dc/terms/"/>
-    <ds:schemaRef ds:uri="http://schemas.microsoft.com/internal/obd"/>
+    <ds:schemaRef ds:uri="http://schemas.microsoft.com/sharepoint/v3/contenttype/forms"/>
   </ds:schemaRefs>
 </ds:datastoreItem>
 </file>
@@ -20481,9 +20469,21 @@
 </file>
 
 <file path=customXml/itemProps3.xml><?xml version="1.0" encoding="utf-8"?>
-<ds:datastoreItem xmlns:ds="http://schemas.openxmlformats.org/officeDocument/2006/customXml" ds:itemID="{158EBE6C-F96B-4BB0-A894-BE91EDC32CEB}">
+<ds:datastoreItem xmlns:ds="http://schemas.openxmlformats.org/officeDocument/2006/customXml" ds:itemID="{7739C07D-175D-4795-BC78-2FBA4DE737F8}">
   <ds:schemaRefs>
-    <ds:schemaRef ds:uri="http://schemas.microsoft.com/sharepoint/v3/contenttype/forms"/>
+    <ds:schemaRef ds:uri="http://schemas.microsoft.com/office/2006/metadata/contentType"/>
+    <ds:schemaRef ds:uri="http://schemas.microsoft.com/office/2006/metadata/properties/metaAttributes"/>
+    <ds:schemaRef ds:uri="http://www.w3.org/2001/XMLSchema"/>
+    <ds:schemaRef ds:uri="http://schemas.microsoft.com/office/2006/metadata/properties"/>
+    <ds:schemaRef ds:uri="http://schemas.microsoft.com/sharepoint/v3"/>
+    <ds:schemaRef ds:uri="2023ac63-7b75-4916-a9ee-591457758eee"/>
+    <ds:schemaRef ds:uri="d9c797ad-d7c3-4982-82b7-81352a75e4a5"/>
+    <ds:schemaRef ds:uri="http://schemas.microsoft.com/office/2006/documentManagement/types"/>
+    <ds:schemaRef ds:uri="http://schemas.microsoft.com/office/infopath/2007/PartnerControls"/>
+    <ds:schemaRef ds:uri="http://schemas.openxmlformats.org/package/2006/metadata/core-properties"/>
+    <ds:schemaRef ds:uri="http://purl.org/dc/elements/1.1/"/>
+    <ds:schemaRef ds:uri="http://purl.org/dc/terms/"/>
+    <ds:schemaRef ds:uri="http://schemas.microsoft.com/internal/obd"/>
   </ds:schemaRefs>
 </ds:datastoreItem>
 </file>
</xml_diff>

<commit_message>
Updates for Azure DevOps rebranding.
</commit_message>
<xml_diff>
--- a/Whiteboard design session/WDS trainer presentation - Containers and DevOps.pptx
+++ b/Whiteboard design session/WDS trainer presentation - Containers and DevOps.pptx
@@ -2,37 +2,37 @@
 <file path=ppt/presentation.xml><?xml version="1.0" encoding="utf-8"?>
 <p:presentation xmlns:a="http://schemas.openxmlformats.org/drawingml/2006/main" xmlns:r="http://schemas.openxmlformats.org/officeDocument/2006/relationships" xmlns:p="http://schemas.openxmlformats.org/presentationml/2006/main" removePersonalInfoOnSave="1" saveSubsetFonts="1">
   <p:sldMasterIdLst>
-    <p:sldMasterId id="2147483660" r:id="rId4"/>
-    <p:sldMasterId id="2147483665" r:id="rId5"/>
+    <p:sldMasterId id="2147483660" r:id="rId1"/>
+    <p:sldMasterId id="2147483665" r:id="rId2"/>
   </p:sldMasterIdLst>
   <p:notesMasterIdLst>
-    <p:notesMasterId r:id="rId30"/>
+    <p:notesMasterId r:id="rId27"/>
   </p:notesMasterIdLst>
   <p:sldIdLst>
-    <p:sldId id="300" r:id="rId6"/>
-    <p:sldId id="323" r:id="rId7"/>
-    <p:sldId id="302" r:id="rId8"/>
-    <p:sldId id="303" r:id="rId9"/>
-    <p:sldId id="259" r:id="rId10"/>
-    <p:sldId id="324" r:id="rId11"/>
-    <p:sldId id="325" r:id="rId12"/>
-    <p:sldId id="327" r:id="rId13"/>
-    <p:sldId id="328" r:id="rId14"/>
-    <p:sldId id="329" r:id="rId15"/>
-    <p:sldId id="326" r:id="rId16"/>
-    <p:sldId id="304" r:id="rId17"/>
-    <p:sldId id="305" r:id="rId18"/>
-    <p:sldId id="330" r:id="rId19"/>
-    <p:sldId id="320" r:id="rId20"/>
-    <p:sldId id="322" r:id="rId21"/>
-    <p:sldId id="321" r:id="rId22"/>
-    <p:sldId id="317" r:id="rId23"/>
-    <p:sldId id="316" r:id="rId24"/>
-    <p:sldId id="332" r:id="rId25"/>
-    <p:sldId id="319" r:id="rId26"/>
-    <p:sldId id="333" r:id="rId27"/>
-    <p:sldId id="318" r:id="rId28"/>
-    <p:sldId id="315" r:id="rId29"/>
+    <p:sldId id="300" r:id="rId3"/>
+    <p:sldId id="323" r:id="rId4"/>
+    <p:sldId id="302" r:id="rId5"/>
+    <p:sldId id="303" r:id="rId6"/>
+    <p:sldId id="259" r:id="rId7"/>
+    <p:sldId id="324" r:id="rId8"/>
+    <p:sldId id="325" r:id="rId9"/>
+    <p:sldId id="327" r:id="rId10"/>
+    <p:sldId id="328" r:id="rId11"/>
+    <p:sldId id="329" r:id="rId12"/>
+    <p:sldId id="326" r:id="rId13"/>
+    <p:sldId id="304" r:id="rId14"/>
+    <p:sldId id="305" r:id="rId15"/>
+    <p:sldId id="330" r:id="rId16"/>
+    <p:sldId id="320" r:id="rId17"/>
+    <p:sldId id="322" r:id="rId18"/>
+    <p:sldId id="321" r:id="rId19"/>
+    <p:sldId id="317" r:id="rId20"/>
+    <p:sldId id="316" r:id="rId21"/>
+    <p:sldId id="332" r:id="rId22"/>
+    <p:sldId id="319" r:id="rId23"/>
+    <p:sldId id="333" r:id="rId24"/>
+    <p:sldId id="318" r:id="rId25"/>
+    <p:sldId id="315" r:id="rId26"/>
   </p:sldIdLst>
   <p:sldSz cx="12192000" cy="6858000"/>
   <p:notesSz cx="6858000" cy="9144000"/>
@@ -221,7 +221,7 @@
           <a:p>
             <a:fld id="{52A13B17-C506-4D51-BB37-16B365906619}" type="datetimeFigureOut">
               <a:rPr lang="en-US" smtClean="0"/>
-              <a:t>8/22/2018</a:t>
+              <a:t>10/21/2018</a:t>
             </a:fld>
             <a:endParaRPr lang="en-US"/>
           </a:p>
@@ -2177,7 +2177,7 @@
                   <a:prstClr val="black"/>
                 </a:solidFill>
               </a:rPr>
-              <a:t>8/22/2018 10:09 AM</a:t>
+              <a:t>10/21/2018 12:50 PM</a:t>
             </a:fld>
             <a:endParaRPr lang="en-US" dirty="0">
               <a:solidFill>
@@ -15351,25 +15351,7 @@
                 </a:solidFill>
                 <a:latin typeface="+mj-lt"/>
               </a:rPr>
-              <a:t>Migrate MongoDB data to </a:t>
-            </a:r>
-            <a:r>
-              <a:rPr lang="en-US" sz="2800" dirty="0" err="1">
-                <a:solidFill>
-                  <a:schemeClr val="tx1"/>
-                </a:solidFill>
-                <a:latin typeface="+mj-lt"/>
-              </a:rPr>
-              <a:t>CosmosDB</a:t>
-            </a:r>
-            <a:r>
-              <a:rPr lang="en-US" sz="2800" dirty="0">
-                <a:solidFill>
-                  <a:schemeClr val="tx1"/>
-                </a:solidFill>
-                <a:latin typeface="+mj-lt"/>
-              </a:rPr>
-              <a:t> without application changes</a:t>
+              <a:t>Migrate MongoDB data to Cosmos DB without application changes</a:t>
             </a:r>
           </a:p>
           <a:p>
@@ -15401,7 +15383,7 @@
                 </a:solidFill>
                 <a:latin typeface="+mj-lt"/>
               </a:rPr>
-              <a:t>Look at VSTS as the CICD tool of choice</a:t>
+              <a:t>Look at Azure DevOps as the CICD tool of choice</a:t>
             </a:r>
           </a:p>
           <a:p>
@@ -15949,56 +15931,39 @@
                 </a:solidFill>
                 <a:latin typeface="+mj-lt"/>
               </a:rPr>
-              <a:t>VSTS for CICD to Azure Kubernetes Service (AKS)</a:t>
+              <a:t>Azure DevOps for CICD to Azure Kubernetes Service (AKS)</a:t>
             </a:r>
           </a:p>
         </p:txBody>
       </p:sp>
       <p:pic>
         <p:nvPicPr>
-          <p:cNvPr id="1026" name="Picture 2" descr="A diagram showing the VSTS DevOps workflow to build Docker images from source code, push images to Azure Container Registry, and deploy to Azure Container Service using Kubernetes, Swarm or DCOS).">
+          <p:cNvPr id="4" name="Picture 3" descr="A diagram showing the Azure DevOps workflow to build Docker images from source code, push images to Azure Container Registry, and deploy to Azure Container Service using Kubernetes, Swarm or DCOS.">
             <a:extLst>
               <a:ext uri="{FF2B5EF4-FFF2-40B4-BE49-F238E27FC236}">
-                <a16:creationId xmlns:a16="http://schemas.microsoft.com/office/drawing/2014/main" id="{D848FBB8-DB5E-48C8-9111-518DF8FB2F55}"/>
+                <a16:creationId xmlns:a16="http://schemas.microsoft.com/office/drawing/2014/main" id="{0305F324-4B77-45E3-80FB-814D71A1C0AE}"/>
               </a:ext>
             </a:extLst>
           </p:cNvPr>
           <p:cNvPicPr>
-            <a:picLocks noChangeAspect="1" noChangeArrowheads="1"/>
+            <a:picLocks noChangeAspect="1"/>
           </p:cNvPicPr>
           <p:nvPr/>
         </p:nvPicPr>
         <p:blipFill>
-          <a:blip r:embed="rId3">
-            <a:extLst>
-              <a:ext uri="{28A0092B-C50C-407E-A947-70E740481C1C}">
-                <a14:useLocalDpi xmlns:a14="http://schemas.microsoft.com/office/drawing/2010/main" val="0"/>
-              </a:ext>
-            </a:extLst>
-          </a:blip>
-          <a:srcRect/>
+          <a:blip r:embed="rId3"/>
           <a:stretch>
             <a:fillRect/>
           </a:stretch>
         </p:blipFill>
-        <p:spPr bwMode="auto">
+        <p:spPr>
           <a:xfrm>
-            <a:off x="1764005" y="2096199"/>
-            <a:ext cx="8143875" cy="4343400"/>
+            <a:off x="2220743" y="1866588"/>
+            <a:ext cx="7230398" cy="4701901"/>
           </a:xfrm>
           <a:prstGeom prst="rect">
             <a:avLst/>
           </a:prstGeom>
-          <a:noFill/>
-          <a:extLst>
-            <a:ext uri="{909E8E84-426E-40DD-AFC4-6F175D3DCCD1}">
-              <a14:hiddenFill xmlns:a14="http://schemas.microsoft.com/office/drawing/2010/main">
-                <a:solidFill>
-                  <a:srgbClr val="FFFFFF"/>
-                </a:solidFill>
-              </a14:hiddenFill>
-            </a:ext>
-          </a:extLst>
         </p:spPr>
       </p:pic>
     </p:spTree>
@@ -17329,7 +17294,7 @@
             <a:pPr lvl="1"/>
             <a:r>
               <a:rPr lang="en-US" sz="3600" dirty="0"/>
-              <a:t>They also decided to move forward with VSTS for infrastructure and container DevOps workflows</a:t>
+              <a:t>They also decided to move forward with Azure DevOps for infrastructure and container DevOps workflows</a:t>
             </a:r>
           </a:p>
           <a:p>
@@ -20220,270 +20185,4 @@
     </a:ext>
   </a:extLst>
 </a:theme>
-</file>
-
-<file path=customXml/item1.xml><?xml version="1.0" encoding="utf-8"?>
-<?mso-contentType ?>
-<FormTemplates xmlns="http://schemas.microsoft.com/sharepoint/v3/contenttype/forms">
-  <Display>DocumentLibraryForm</Display>
-  <Edit>DocumentLibraryForm</Edit>
-  <New>DocumentLibraryForm</New>
-</FormTemplates>
-</file>
-
-<file path=customXml/item2.xml><?xml version="1.0" encoding="utf-8"?>
-<p:properties xmlns:p="http://schemas.microsoft.com/office/2006/metadata/properties" xmlns:xsi="http://www.w3.org/2001/XMLSchema-instance" xmlns:pc="http://schemas.microsoft.com/office/infopath/2007/PartnerControls">
-  <documentManagement>
-    <_ip_UnifiedCompliancePolicyUIAction xmlns="http://schemas.microsoft.com/sharepoint/v3" xsi:nil="true"/>
-    <_ip_UnifiedCompliancePolicyProperties xmlns="http://schemas.microsoft.com/sharepoint/v3" xsi:nil="true"/>
-  </documentManagement>
-</p:properties>
-</file>
-
-<file path=customXml/item3.xml><?xml version="1.0" encoding="utf-8"?>
-<ct:contentTypeSchema xmlns:ct="http://schemas.microsoft.com/office/2006/metadata/contentType" xmlns:ma="http://schemas.microsoft.com/office/2006/metadata/properties/metaAttributes" ct:_="" ma:_="" ma:contentTypeName="Document" ma:contentTypeID="0x010100D15DFA3690A15B4081582BBCC6BEAC3E" ma:contentTypeVersion="9" ma:contentTypeDescription="Create a new document." ma:contentTypeScope="" ma:versionID="642da1784587cbe85a7fdbbe4dc36103">
-  <xsd:schema xmlns:xsd="http://www.w3.org/2001/XMLSchema" xmlns:xs="http://www.w3.org/2001/XMLSchema" xmlns:p="http://schemas.microsoft.com/office/2006/metadata/properties" xmlns:ns1="http://schemas.microsoft.com/sharepoint/v3" xmlns:ns2="2023ac63-7b75-4916-a9ee-591457758eee" xmlns:ns3="d9c797ad-d7c3-4982-82b7-81352a75e4a5" targetNamespace="http://schemas.microsoft.com/office/2006/metadata/properties" ma:root="true" ma:fieldsID="91198b0246576053cc55dd2c67035a89" ns1:_="" ns2:_="" ns3:_="">
-    <xsd:import namespace="http://schemas.microsoft.com/sharepoint/v3"/>
-    <xsd:import namespace="2023ac63-7b75-4916-a9ee-591457758eee"/>
-    <xsd:import namespace="d9c797ad-d7c3-4982-82b7-81352a75e4a5"/>
-    <xsd:element name="properties">
-      <xsd:complexType>
-        <xsd:sequence>
-          <xsd:element name="documentManagement">
-            <xsd:complexType>
-              <xsd:all>
-                <xsd:element ref="ns2:SharedWithUsers" minOccurs="0"/>
-                <xsd:element ref="ns2:SharedWithDetails" minOccurs="0"/>
-                <xsd:element ref="ns2:LastSharedByUser" minOccurs="0"/>
-                <xsd:element ref="ns2:LastSharedByTime" minOccurs="0"/>
-                <xsd:element ref="ns3:MediaServiceMetadata" minOccurs="0"/>
-                <xsd:element ref="ns3:MediaServiceFastMetadata" minOccurs="0"/>
-                <xsd:element ref="ns1:_ip_UnifiedCompliancePolicyProperties" minOccurs="0"/>
-                <xsd:element ref="ns1:_ip_UnifiedCompliancePolicyUIAction" minOccurs="0"/>
-                <xsd:element ref="ns3:MediaServiceDateTaken" minOccurs="0"/>
-              </xsd:all>
-            </xsd:complexType>
-          </xsd:element>
-        </xsd:sequence>
-      </xsd:complexType>
-    </xsd:element>
-  </xsd:schema>
-  <xsd:schema xmlns:xsd="http://www.w3.org/2001/XMLSchema" xmlns:xs="http://www.w3.org/2001/XMLSchema" xmlns:dms="http://schemas.microsoft.com/office/2006/documentManagement/types" xmlns:pc="http://schemas.microsoft.com/office/infopath/2007/PartnerControls" targetNamespace="http://schemas.microsoft.com/sharepoint/v3" elementFormDefault="qualified">
-    <xsd:import namespace="http://schemas.microsoft.com/office/2006/documentManagement/types"/>
-    <xsd:import namespace="http://schemas.microsoft.com/office/infopath/2007/PartnerControls"/>
-    <xsd:element name="_ip_UnifiedCompliancePolicyProperties" ma:index="14" nillable="true" ma:displayName="Unified Compliance Policy Properties" ma:description="" ma:hidden="true" ma:internalName="_ip_UnifiedCompliancePolicyProperties">
-      <xsd:simpleType>
-        <xsd:restriction base="dms:Note"/>
-      </xsd:simpleType>
-    </xsd:element>
-    <xsd:element name="_ip_UnifiedCompliancePolicyUIAction" ma:index="15" nillable="true" ma:displayName="Unified Compliance Policy UI Action" ma:description="" ma:hidden="true" ma:internalName="_ip_UnifiedCompliancePolicyUIAction">
-      <xsd:simpleType>
-        <xsd:restriction base="dms:Text"/>
-      </xsd:simpleType>
-    </xsd:element>
-  </xsd:schema>
-  <xsd:schema xmlns:xsd="http://www.w3.org/2001/XMLSchema" xmlns:xs="http://www.w3.org/2001/XMLSchema" xmlns:dms="http://schemas.microsoft.com/office/2006/documentManagement/types" xmlns:pc="http://schemas.microsoft.com/office/infopath/2007/PartnerControls" targetNamespace="2023ac63-7b75-4916-a9ee-591457758eee" elementFormDefault="qualified">
-    <xsd:import namespace="http://schemas.microsoft.com/office/2006/documentManagement/types"/>
-    <xsd:import namespace="http://schemas.microsoft.com/office/infopath/2007/PartnerControls"/>
-    <xsd:element name="SharedWithUsers" ma:index="8" nillable="true" ma:displayName="Shared With" ma:description="" ma:internalName="SharedWithUsers" ma:readOnly="true">
-      <xsd:complexType>
-        <xsd:complexContent>
-          <xsd:extension base="dms:UserMulti">
-            <xsd:sequence>
-              <xsd:element name="UserInfo" minOccurs="0" maxOccurs="unbounded">
-                <xsd:complexType>
-                  <xsd:sequence>
-                    <xsd:element name="DisplayName" type="xsd:string" minOccurs="0"/>
-                    <xsd:element name="AccountId" type="dms:UserId" minOccurs="0" nillable="true"/>
-                    <xsd:element name="AccountType" type="xsd:string" minOccurs="0"/>
-                  </xsd:sequence>
-                </xsd:complexType>
-              </xsd:element>
-            </xsd:sequence>
-          </xsd:extension>
-        </xsd:complexContent>
-      </xsd:complexType>
-    </xsd:element>
-    <xsd:element name="SharedWithDetails" ma:index="9" nillable="true" ma:displayName="Shared With Details" ma:description="" ma:internalName="SharedWithDetails" ma:readOnly="true">
-      <xsd:simpleType>
-        <xsd:restriction base="dms:Note">
-          <xsd:maxLength value="255"/>
-        </xsd:restriction>
-      </xsd:simpleType>
-    </xsd:element>
-    <xsd:element name="LastSharedByUser" ma:index="10" nillable="true" ma:displayName="Last Shared By User" ma:description="" ma:internalName="LastSharedByUser" ma:readOnly="true">
-      <xsd:simpleType>
-        <xsd:restriction base="dms:Note">
-          <xsd:maxLength value="255"/>
-        </xsd:restriction>
-      </xsd:simpleType>
-    </xsd:element>
-    <xsd:element name="LastSharedByTime" ma:index="11" nillable="true" ma:displayName="Last Shared By Time" ma:description="" ma:internalName="LastSharedByTime" ma:readOnly="true">
-      <xsd:simpleType>
-        <xsd:restriction base="dms:DateTime"/>
-      </xsd:simpleType>
-    </xsd:element>
-  </xsd:schema>
-  <xsd:schema xmlns:xsd="http://www.w3.org/2001/XMLSchema" xmlns:xs="http://www.w3.org/2001/XMLSchema" xmlns:dms="http://schemas.microsoft.com/office/2006/documentManagement/types" xmlns:pc="http://schemas.microsoft.com/office/infopath/2007/PartnerControls" targetNamespace="d9c797ad-d7c3-4982-82b7-81352a75e4a5" elementFormDefault="qualified">
-    <xsd:import namespace="http://schemas.microsoft.com/office/2006/documentManagement/types"/>
-    <xsd:import namespace="http://schemas.microsoft.com/office/infopath/2007/PartnerControls"/>
-    <xsd:element name="MediaServiceMetadata" ma:index="12" nillable="true" ma:displayName="MediaServiceMetadata" ma:description="" ma:hidden="true" ma:internalName="MediaServiceMetadata" ma:readOnly="true">
-      <xsd:simpleType>
-        <xsd:restriction base="dms:Note"/>
-      </xsd:simpleType>
-    </xsd:element>
-    <xsd:element name="MediaServiceFastMetadata" ma:index="13" nillable="true" ma:displayName="MediaServiceFastMetadata" ma:description="" ma:hidden="true" ma:internalName="MediaServiceFastMetadata" ma:readOnly="true">
-      <xsd:simpleType>
-        <xsd:restriction base="dms:Note"/>
-      </xsd:simpleType>
-    </xsd:element>
-    <xsd:element name="MediaServiceDateTaken" ma:index="16" nillable="true" ma:displayName="MediaServiceDateTaken" ma:hidden="true" ma:internalName="MediaServiceDateTaken" ma:readOnly="true">
-      <xsd:simpleType>
-        <xsd:restriction base="dms:Text"/>
-      </xsd:simpleType>
-    </xsd:element>
-  </xsd:schema>
-  <xsd:schema xmlns="http://schemas.openxmlformats.org/package/2006/metadata/core-properties" xmlns:xsd="http://www.w3.org/2001/XMLSchema" xmlns:xsi="http://www.w3.org/2001/XMLSchema-instance" xmlns:dc="http://purl.org/dc/elements/1.1/" xmlns:dcterms="http://purl.org/dc/terms/" xmlns:odoc="http://schemas.microsoft.com/internal/obd" targetNamespace="http://schemas.openxmlformats.org/package/2006/metadata/core-properties" elementFormDefault="qualified" attributeFormDefault="unqualified" blockDefault="#all">
-    <xsd:import namespace="http://purl.org/dc/elements/1.1/" schemaLocation="http://dublincore.org/schemas/xmls/qdc/2003/04/02/dc.xsd"/>
-    <xsd:import namespace="http://purl.org/dc/terms/" schemaLocation="http://dublincore.org/schemas/xmls/qdc/2003/04/02/dcterms.xsd"/>
-    <xsd:element name="coreProperties" type="CT_coreProperties"/>
-    <xsd:complexType name="CT_coreProperties">
-      <xsd:all>
-        <xsd:element ref="dc:creator" minOccurs="0" maxOccurs="1"/>
-        <xsd:element ref="dcterms:created" minOccurs="0" maxOccurs="1"/>
-        <xsd:element ref="dc:identifier" minOccurs="0" maxOccurs="1"/>
-        <xsd:element name="contentType" minOccurs="0" maxOccurs="1" type="xsd:string" ma:index="0" ma:displayName="Content Type"/>
-        <xsd:element ref="dc:title" minOccurs="0" maxOccurs="1" ma:index="4" ma:displayName="Title"/>
-        <xsd:element ref="dc:subject" minOccurs="0" maxOccurs="1"/>
-        <xsd:element ref="dc:description" minOccurs="0" maxOccurs="1"/>
-        <xsd:element name="keywords" minOccurs="0" maxOccurs="1" type="xsd:string"/>
-        <xsd:element ref="dc:language" minOccurs="0" maxOccurs="1"/>
-        <xsd:element name="category" minOccurs="0" maxOccurs="1" type="xsd:string"/>
-        <xsd:element name="version" minOccurs="0" maxOccurs="1" type="xsd:string"/>
-        <xsd:element name="revision" minOccurs="0" maxOccurs="1" type="xsd:string">
-          <xsd:annotation>
-            <xsd:documentation>
-                        This value indicates the number of saves or revisions. The application is responsible for updating this value after each revision.
-                    </xsd:documentation>
-          </xsd:annotation>
-        </xsd:element>
-        <xsd:element name="lastModifiedBy" minOccurs="0" maxOccurs="1" type="xsd:string"/>
-        <xsd:element ref="dcterms:modified" minOccurs="0" maxOccurs="1"/>
-        <xsd:element name="contentStatus" minOccurs="0" maxOccurs="1" type="xsd:string"/>
-      </xsd:all>
-    </xsd:complexType>
-  </xsd:schema>
-  <xs:schema xmlns:pc="http://schemas.microsoft.com/office/infopath/2007/PartnerControls" xmlns:xs="http://www.w3.org/2001/XMLSchema" targetNamespace="http://schemas.microsoft.com/office/infopath/2007/PartnerControls" elementFormDefault="qualified" attributeFormDefault="unqualified">
-    <xs:element name="Person">
-      <xs:complexType>
-        <xs:sequence>
-          <xs:element ref="pc:DisplayName" minOccurs="0"/>
-          <xs:element ref="pc:AccountId" minOccurs="0"/>
-          <xs:element ref="pc:AccountType" minOccurs="0"/>
-        </xs:sequence>
-      </xs:complexType>
-    </xs:element>
-    <xs:element name="DisplayName" type="xs:string"/>
-    <xs:element name="AccountId" type="xs:string"/>
-    <xs:element name="AccountType" type="xs:string"/>
-    <xs:element name="BDCAssociatedEntity">
-      <xs:complexType>
-        <xs:sequence>
-          <xs:element ref="pc:BDCEntity" minOccurs="0" maxOccurs="unbounded"/>
-        </xs:sequence>
-        <xs:attribute ref="pc:EntityNamespace"/>
-        <xs:attribute ref="pc:EntityName"/>
-        <xs:attribute ref="pc:SystemInstanceName"/>
-        <xs:attribute ref="pc:AssociationName"/>
-      </xs:complexType>
-    </xs:element>
-    <xs:attribute name="EntityNamespace" type="xs:string"/>
-    <xs:attribute name="EntityName" type="xs:string"/>
-    <xs:attribute name="SystemInstanceName" type="xs:string"/>
-    <xs:attribute name="AssociationName" type="xs:string"/>
-    <xs:element name="BDCEntity">
-      <xs:complexType>
-        <xs:sequence>
-          <xs:element ref="pc:EntityDisplayName" minOccurs="0"/>
-          <xs:element ref="pc:EntityInstanceReference" minOccurs="0"/>
-          <xs:element ref="pc:EntityId1" minOccurs="0"/>
-          <xs:element ref="pc:EntityId2" minOccurs="0"/>
-          <xs:element ref="pc:EntityId3" minOccurs="0"/>
-          <xs:element ref="pc:EntityId4" minOccurs="0"/>
-          <xs:element ref="pc:EntityId5" minOccurs="0"/>
-        </xs:sequence>
-      </xs:complexType>
-    </xs:element>
-    <xs:element name="EntityDisplayName" type="xs:string"/>
-    <xs:element name="EntityInstanceReference" type="xs:string"/>
-    <xs:element name="EntityId1" type="xs:string"/>
-    <xs:element name="EntityId2" type="xs:string"/>
-    <xs:element name="EntityId3" type="xs:string"/>
-    <xs:element name="EntityId4" type="xs:string"/>
-    <xs:element name="EntityId5" type="xs:string"/>
-    <xs:element name="Terms">
-      <xs:complexType>
-        <xs:sequence>
-          <xs:element ref="pc:TermInfo" minOccurs="0" maxOccurs="unbounded"/>
-        </xs:sequence>
-      </xs:complexType>
-    </xs:element>
-    <xs:element name="TermInfo">
-      <xs:complexType>
-        <xs:sequence>
-          <xs:element ref="pc:TermName" minOccurs="0"/>
-          <xs:element ref="pc:TermId" minOccurs="0"/>
-        </xs:sequence>
-      </xs:complexType>
-    </xs:element>
-    <xs:element name="TermName" type="xs:string"/>
-    <xs:element name="TermId" type="xs:string"/>
-  </xs:schema>
-</ct:contentTypeSchema>
-</file>
-
-<file path=customXml/itemProps1.xml><?xml version="1.0" encoding="utf-8"?>
-<ds:datastoreItem xmlns:ds="http://schemas.openxmlformats.org/officeDocument/2006/customXml" ds:itemID="{158EBE6C-F96B-4BB0-A894-BE91EDC32CEB}">
-  <ds:schemaRefs>
-    <ds:schemaRef ds:uri="http://schemas.microsoft.com/sharepoint/v3/contenttype/forms"/>
-  </ds:schemaRefs>
-</ds:datastoreItem>
-</file>
-
-<file path=customXml/itemProps2.xml><?xml version="1.0" encoding="utf-8"?>
-<ds:datastoreItem xmlns:ds="http://schemas.openxmlformats.org/officeDocument/2006/customXml" ds:itemID="{31C66A41-D5D1-47A0-92FC-E1A1B9B5AA14}">
-  <ds:schemaRefs>
-    <ds:schemaRef ds:uri="http://purl.org/dc/elements/1.1/"/>
-    <ds:schemaRef ds:uri="http://schemas.microsoft.com/office/2006/metadata/properties"/>
-    <ds:schemaRef ds:uri="http://schemas.openxmlformats.org/package/2006/metadata/core-properties"/>
-    <ds:schemaRef ds:uri="http://purl.org/dc/terms/"/>
-    <ds:schemaRef ds:uri="2023ac63-7b75-4916-a9ee-591457758eee"/>
-    <ds:schemaRef ds:uri="http://schemas.microsoft.com/office/2006/documentManagement/types"/>
-    <ds:schemaRef ds:uri="http://schemas.microsoft.com/office/infopath/2007/PartnerControls"/>
-    <ds:schemaRef ds:uri="d9c797ad-d7c3-4982-82b7-81352a75e4a5"/>
-    <ds:schemaRef ds:uri="http://schemas.microsoft.com/sharepoint/v3"/>
-    <ds:schemaRef ds:uri="http://www.w3.org/XML/1998/namespace"/>
-    <ds:schemaRef ds:uri="http://purl.org/dc/dcmitype/"/>
-  </ds:schemaRefs>
-</ds:datastoreItem>
-</file>
-
-<file path=customXml/itemProps3.xml><?xml version="1.0" encoding="utf-8"?>
-<ds:datastoreItem xmlns:ds="http://schemas.openxmlformats.org/officeDocument/2006/customXml" ds:itemID="{7739C07D-175D-4795-BC78-2FBA4DE737F8}">
-  <ds:schemaRefs>
-    <ds:schemaRef ds:uri="http://schemas.microsoft.com/office/2006/metadata/contentType"/>
-    <ds:schemaRef ds:uri="http://schemas.microsoft.com/office/2006/metadata/properties/metaAttributes"/>
-    <ds:schemaRef ds:uri="http://www.w3.org/2001/XMLSchema"/>
-    <ds:schemaRef ds:uri="http://schemas.microsoft.com/office/2006/metadata/properties"/>
-    <ds:schemaRef ds:uri="http://schemas.microsoft.com/sharepoint/v3"/>
-    <ds:schemaRef ds:uri="2023ac63-7b75-4916-a9ee-591457758eee"/>
-    <ds:schemaRef ds:uri="d9c797ad-d7c3-4982-82b7-81352a75e4a5"/>
-    <ds:schemaRef ds:uri="http://schemas.microsoft.com/office/2006/documentManagement/types"/>
-    <ds:schemaRef ds:uri="http://schemas.microsoft.com/office/infopath/2007/PartnerControls"/>
-    <ds:schemaRef ds:uri="http://schemas.openxmlformats.org/package/2006/metadata/core-properties"/>
-    <ds:schemaRef ds:uri="http://purl.org/dc/elements/1.1/"/>
-    <ds:schemaRef ds:uri="http://purl.org/dc/terms/"/>
-    <ds:schemaRef ds:uri="http://schemas.microsoft.com/internal/obd"/>
-  </ds:schemaRefs>
-</ds:datastoreItem>
 </file>
</xml_diff>

<commit_message>
Changed initial web app hosting to VMs in Azure
</commit_message>
<xml_diff>
--- a/Whiteboard design session/WDS trainer presentation - Containers and DevOps.pptx
+++ b/Whiteboard design session/WDS trainer presentation - Containers and DevOps.pptx
@@ -221,7 +221,7 @@
           <a:p>
             <a:fld id="{52A13B17-C506-4D51-BB37-16B365906619}" type="datetimeFigureOut">
               <a:rPr lang="en-US" smtClean="0"/>
-              <a:t>10/21/2018</a:t>
+              <a:t>4/2/2019</a:t>
             </a:fld>
             <a:endParaRPr lang="en-US"/>
           </a:p>
@@ -2177,7 +2177,7 @@
                   <a:prstClr val="black"/>
                 </a:solidFill>
               </a:rPr>
-              <a:t>10/21/2018 12:50 PM</a:t>
+              <a:t>4/2/2019 4:04 PM</a:t>
             </a:fld>
             <a:endParaRPr lang="en-US" dirty="0">
               <a:solidFill>
@@ -18922,7 +18922,7 @@
             <a:pPr lvl="1"/>
             <a:r>
               <a:rPr lang="en-US" sz="2800" b="1" dirty="0"/>
-              <a:t>Conference sites are currently hosted in Azure </a:t>
+              <a:t>Conference sites are currently hosted on VMs in Azure</a:t>
             </a:r>
           </a:p>
           <a:p>
@@ -19086,7 +19086,15 @@
             <a:pPr lvl="2" fontAlgn="base"/>
             <a:r>
               <a:rPr lang="en-US" sz="2400" b="1" dirty="0"/>
-              <a:t>The tenant’s code is deployed to the App Service Plan (VM)</a:t>
+              <a:t>The tenant’s code is deployed to a </a:t>
+            </a:r>
+            <a:r>
+              <a:rPr lang="en-US" sz="2400" b="1"/>
+              <a:t>VM in Azur</a:t>
+            </a:r>
+            <a:r>
+              <a:rPr lang="en-US" sz="2400" b="1" dirty="0"/>
+              <a:t>e</a:t>
             </a:r>
           </a:p>
           <a:p>

</xml_diff>

<commit_message>
Updating web app hosting to VMs in Azure.
</commit_message>
<xml_diff>
--- a/Whiteboard design session/WDS trainer presentation - Containers and DevOps.pptx
+++ b/Whiteboard design session/WDS trainer presentation - Containers and DevOps.pptx
@@ -221,7 +221,7 @@
           <a:p>
             <a:fld id="{52A13B17-C506-4D51-BB37-16B365906619}" type="datetimeFigureOut">
               <a:rPr lang="en-US" smtClean="0"/>
-              <a:t>10/21/2018</a:t>
+              <a:t>4/2/2019</a:t>
             </a:fld>
             <a:endParaRPr lang="en-US"/>
           </a:p>
@@ -2177,7 +2177,7 @@
                   <a:prstClr val="black"/>
                 </a:solidFill>
               </a:rPr>
-              <a:t>10/21/2018 12:50 PM</a:t>
+              <a:t>4/2/2019 4:39 PM</a:t>
             </a:fld>
             <a:endParaRPr lang="en-US" dirty="0">
               <a:solidFill>
@@ -18929,7 +18929,7 @@
             <a:pPr lvl="1" fontAlgn="base"/>
             <a:r>
               <a:rPr lang="en-US" sz="2800" b="1" dirty="0"/>
-              <a:t>Web applications and APIs hosted in Azure App Services</a:t>
+              <a:t>Web applications and APIs hosted on VMs in Azure</a:t>
             </a:r>
           </a:p>
           <a:p>
@@ -19086,7 +19086,7 @@
             <a:pPr lvl="2" fontAlgn="base"/>
             <a:r>
               <a:rPr lang="en-US" sz="2400" b="1" dirty="0"/>
-              <a:t>The tenant’s code is deployed to the App Service Plan (VM)</a:t>
+              <a:t>The tenant’s code is deployed to a VM hosted in Azure</a:t>
             </a:r>
           </a:p>
           <a:p>

</xml_diff>

<commit_message>
updates to WDS as discussed, includes changes to slides, trainer and student guides
</commit_message>
<xml_diff>
--- a/Whiteboard design session/WDS trainer presentation - Containers and DevOps.pptx
+++ b/Whiteboard design session/WDS trainer presentation - Containers and DevOps.pptx
@@ -6,7 +6,7 @@
     <p:sldMasterId id="2147483665" r:id="rId2"/>
   </p:sldMasterIdLst>
   <p:notesMasterIdLst>
-    <p:notesMasterId r:id="rId27"/>
+    <p:notesMasterId r:id="rId26"/>
   </p:notesMasterIdLst>
   <p:sldIdLst>
     <p:sldId id="300" r:id="rId3"/>
@@ -18,21 +18,20 @@
     <p:sldId id="325" r:id="rId9"/>
     <p:sldId id="327" r:id="rId10"/>
     <p:sldId id="328" r:id="rId11"/>
-    <p:sldId id="329" r:id="rId12"/>
-    <p:sldId id="326" r:id="rId13"/>
-    <p:sldId id="304" r:id="rId14"/>
-    <p:sldId id="305" r:id="rId15"/>
-    <p:sldId id="330" r:id="rId16"/>
-    <p:sldId id="320" r:id="rId17"/>
-    <p:sldId id="322" r:id="rId18"/>
-    <p:sldId id="321" r:id="rId19"/>
-    <p:sldId id="317" r:id="rId20"/>
-    <p:sldId id="316" r:id="rId21"/>
-    <p:sldId id="332" r:id="rId22"/>
-    <p:sldId id="319" r:id="rId23"/>
-    <p:sldId id="333" r:id="rId24"/>
-    <p:sldId id="318" r:id="rId25"/>
-    <p:sldId id="315" r:id="rId26"/>
+    <p:sldId id="326" r:id="rId12"/>
+    <p:sldId id="304" r:id="rId13"/>
+    <p:sldId id="305" r:id="rId14"/>
+    <p:sldId id="330" r:id="rId15"/>
+    <p:sldId id="320" r:id="rId16"/>
+    <p:sldId id="322" r:id="rId17"/>
+    <p:sldId id="321" r:id="rId18"/>
+    <p:sldId id="317" r:id="rId19"/>
+    <p:sldId id="316" r:id="rId20"/>
+    <p:sldId id="332" r:id="rId21"/>
+    <p:sldId id="319" r:id="rId22"/>
+    <p:sldId id="333" r:id="rId23"/>
+    <p:sldId id="318" r:id="rId24"/>
+    <p:sldId id="315" r:id="rId25"/>
   </p:sldIdLst>
   <p:sldSz cx="12192000" cy="6858000"/>
   <p:notesSz cx="6858000" cy="9144000"/>
@@ -221,7 +220,7 @@
           <a:p>
             <a:fld id="{52A13B17-C506-4D51-BB37-16B365906619}" type="datetimeFigureOut">
               <a:rPr lang="en-US" smtClean="0"/>
-              <a:t>10/21/2018</a:t>
+              <a:t>4/14/19</a:t>
             </a:fld>
             <a:endParaRPr lang="en-US"/>
           </a:p>
@@ -676,6 +675,14 @@
           <a:bodyPr/>
           <a:lstStyle/>
           <a:p>
+            <a:pPr lvl="0"/>
+            <a:endParaRPr lang="en-US" sz="1200" b="1" dirty="0">
+              <a:solidFill>
+                <a:schemeClr val="bg1"/>
+              </a:solidFill>
+            </a:endParaRPr>
+          </a:p>
+          <a:p>
             <a:endParaRPr lang="en-US" dirty="0"/>
           </a:p>
         </p:txBody>
@@ -706,7 +713,7 @@
     </p:spTree>
     <p:extLst>
       <p:ext uri="{BB962C8B-B14F-4D97-AF65-F5344CB8AC3E}">
-        <p14:creationId xmlns:p14="http://schemas.microsoft.com/office/powerpoint/2010/main" val="2270893847"/>
+        <p14:creationId xmlns:p14="http://schemas.microsoft.com/office/powerpoint/2010/main" val="3102264741"/>
       </p:ext>
     </p:extLst>
   </p:cSld>
@@ -760,15 +767,7 @@
           <a:bodyPr/>
           <a:lstStyle/>
           <a:p>
-            <a:pPr lvl="0"/>
-            <a:endParaRPr lang="en-US" sz="1200" b="1" dirty="0">
-              <a:solidFill>
-                <a:schemeClr val="bg1"/>
-              </a:solidFill>
-            </a:endParaRPr>
-          </a:p>
-          <a:p>
-            <a:endParaRPr lang="en-US" dirty="0"/>
+            <a:endParaRPr lang="en-US"/>
           </a:p>
         </p:txBody>
       </p:sp>
@@ -798,7 +797,7 @@
     </p:spTree>
     <p:extLst>
       <p:ext uri="{BB962C8B-B14F-4D97-AF65-F5344CB8AC3E}">
-        <p14:creationId xmlns:p14="http://schemas.microsoft.com/office/powerpoint/2010/main" val="3102264741"/>
+        <p14:creationId xmlns:p14="http://schemas.microsoft.com/office/powerpoint/2010/main" val="1669752691"/>
       </p:ext>
     </p:extLst>
   </p:cSld>
@@ -882,7 +881,7 @@
     </p:spTree>
     <p:extLst>
       <p:ext uri="{BB962C8B-B14F-4D97-AF65-F5344CB8AC3E}">
-        <p14:creationId xmlns:p14="http://schemas.microsoft.com/office/powerpoint/2010/main" val="1669752691"/>
+        <p14:creationId xmlns:p14="http://schemas.microsoft.com/office/powerpoint/2010/main" val="1267405105"/>
       </p:ext>
     </p:extLst>
   </p:cSld>
@@ -966,7 +965,7 @@
     </p:spTree>
     <p:extLst>
       <p:ext uri="{BB962C8B-B14F-4D97-AF65-F5344CB8AC3E}">
-        <p14:creationId xmlns:p14="http://schemas.microsoft.com/office/powerpoint/2010/main" val="1267405105"/>
+        <p14:creationId xmlns:p14="http://schemas.microsoft.com/office/powerpoint/2010/main" val="2732103551"/>
       </p:ext>
     </p:extLst>
   </p:cSld>
@@ -1020,7 +1019,7 @@
           <a:bodyPr/>
           <a:lstStyle/>
           <a:p>
-            <a:endParaRPr lang="en-US"/>
+            <a:endParaRPr lang="en-US" dirty="0"/>
           </a:p>
         </p:txBody>
       </p:sp>
@@ -1050,7 +1049,7 @@
     </p:spTree>
     <p:extLst>
       <p:ext uri="{BB962C8B-B14F-4D97-AF65-F5344CB8AC3E}">
-        <p14:creationId xmlns:p14="http://schemas.microsoft.com/office/powerpoint/2010/main" val="2732103551"/>
+        <p14:creationId xmlns:p14="http://schemas.microsoft.com/office/powerpoint/2010/main" val="3229744285"/>
       </p:ext>
     </p:extLst>
   </p:cSld>
@@ -1134,7 +1133,7 @@
     </p:spTree>
     <p:extLst>
       <p:ext uri="{BB962C8B-B14F-4D97-AF65-F5344CB8AC3E}">
-        <p14:creationId xmlns:p14="http://schemas.microsoft.com/office/powerpoint/2010/main" val="3229744285"/>
+        <p14:creationId xmlns:p14="http://schemas.microsoft.com/office/powerpoint/2010/main" val="251902611"/>
       </p:ext>
     </p:extLst>
   </p:cSld>
@@ -1218,7 +1217,7 @@
     </p:spTree>
     <p:extLst>
       <p:ext uri="{BB962C8B-B14F-4D97-AF65-F5344CB8AC3E}">
-        <p14:creationId xmlns:p14="http://schemas.microsoft.com/office/powerpoint/2010/main" val="251902611"/>
+        <p14:creationId xmlns:p14="http://schemas.microsoft.com/office/powerpoint/2010/main" val="1579283386"/>
       </p:ext>
     </p:extLst>
   </p:cSld>
@@ -1272,6 +1271,52 @@
           <a:bodyPr/>
           <a:lstStyle/>
           <a:p>
+            <a:pPr marL="0" marR="0" lvl="0" indent="0" algn="l" defTabSz="914400" rtl="0" eaLnBrk="1" fontAlgn="auto" latinLnBrk="0" hangingPunct="1">
+              <a:lnSpc>
+                <a:spcPct val="100000"/>
+              </a:lnSpc>
+              <a:spcBef>
+                <a:spcPts val="0"/>
+              </a:spcBef>
+              <a:spcAft>
+                <a:spcPts val="0"/>
+              </a:spcAft>
+              <a:buClrTx/>
+              <a:buSzTx/>
+              <a:buFontTx/>
+              <a:buNone/>
+              <a:tabLst/>
+              <a:defRPr/>
+            </a:pPr>
+            <a:r>
+              <a:rPr lang="en-US" sz="1200" dirty="0"/>
+              <a:t>The primary audience is the technical strategic decision-maker with influential solution architects, or lead technical personnel in development or operations. </a:t>
+            </a:r>
+          </a:p>
+          <a:p>
+            <a:pPr marL="0" marR="0" lvl="0" indent="0" algn="l" defTabSz="914400" rtl="0" eaLnBrk="1" fontAlgn="auto" latinLnBrk="0" hangingPunct="1">
+              <a:lnSpc>
+                <a:spcPct val="100000"/>
+              </a:lnSpc>
+              <a:spcBef>
+                <a:spcPts val="0"/>
+              </a:spcBef>
+              <a:spcAft>
+                <a:spcPts val="0"/>
+              </a:spcAft>
+              <a:buClrTx/>
+              <a:buSzTx/>
+              <a:buFontTx/>
+              <a:buNone/>
+              <a:tabLst/>
+              <a:defRPr/>
+            </a:pPr>
+            <a:r>
+              <a:rPr lang="en-US" sz="1200" dirty="0"/>
+              <a:t>For this example this could include the VP Engineering and his core team. </a:t>
+            </a:r>
+          </a:p>
+          <a:p>
             <a:endParaRPr lang="en-US" dirty="0"/>
           </a:p>
         </p:txBody>
@@ -1302,7 +1347,7 @@
     </p:spTree>
     <p:extLst>
       <p:ext uri="{BB962C8B-B14F-4D97-AF65-F5344CB8AC3E}">
-        <p14:creationId xmlns:p14="http://schemas.microsoft.com/office/powerpoint/2010/main" val="1579283386"/>
+        <p14:creationId xmlns:p14="http://schemas.microsoft.com/office/powerpoint/2010/main" val="647674203"/>
       </p:ext>
     </p:extLst>
   </p:cSld>
@@ -1356,30 +1401,7 @@
           <a:bodyPr/>
           <a:lstStyle/>
           <a:p>
-            <a:pPr marL="0" marR="0" lvl="0" indent="0" algn="l" defTabSz="914400" rtl="0" eaLnBrk="1" fontAlgn="auto" latinLnBrk="0" hangingPunct="1">
-              <a:lnSpc>
-                <a:spcPct val="100000"/>
-              </a:lnSpc>
-              <a:spcBef>
-                <a:spcPts val="0"/>
-              </a:spcBef>
-              <a:spcAft>
-                <a:spcPts val="0"/>
-              </a:spcAft>
-              <a:buClrTx/>
-              <a:buSzTx/>
-              <a:buFontTx/>
-              <a:buNone/>
-              <a:tabLst/>
-              <a:defRPr/>
-            </a:pPr>
-            <a:r>
-              <a:rPr lang="en-US" sz="1200" dirty="0"/>
-              <a:t>The primary audience is the technical strategic decision-maker with influential solution architects, or lead technical personnel in development or operations. For this example this could include the VP Engineering and his core team. </a:t>
-            </a:r>
-          </a:p>
-          <a:p>
-            <a:endParaRPr lang="en-US" dirty="0"/>
+            <a:endParaRPr lang="en-US"/>
           </a:p>
         </p:txBody>
       </p:sp>
@@ -1409,7 +1431,7 @@
     </p:spTree>
     <p:extLst>
       <p:ext uri="{BB962C8B-B14F-4D97-AF65-F5344CB8AC3E}">
-        <p14:creationId xmlns:p14="http://schemas.microsoft.com/office/powerpoint/2010/main" val="647674203"/>
+        <p14:creationId xmlns:p14="http://schemas.microsoft.com/office/powerpoint/2010/main" val="4179281765"/>
       </p:ext>
     </p:extLst>
   </p:cSld>
@@ -1493,7 +1515,7 @@
     </p:spTree>
     <p:extLst>
       <p:ext uri="{BB962C8B-B14F-4D97-AF65-F5344CB8AC3E}">
-        <p14:creationId xmlns:p14="http://schemas.microsoft.com/office/powerpoint/2010/main" val="4179281765"/>
+        <p14:creationId xmlns:p14="http://schemas.microsoft.com/office/powerpoint/2010/main" val="1793785314"/>
       </p:ext>
     </p:extLst>
   </p:cSld>
@@ -1631,7 +1653,49 @@
           <a:bodyPr/>
           <a:lstStyle/>
           <a:p>
-            <a:endParaRPr lang="en-US"/>
+            <a:r>
+              <a:rPr lang="en-US" sz="1200" kern="1200" dirty="0">
+                <a:solidFill>
+                  <a:schemeClr val="tx1"/>
+                </a:solidFill>
+                <a:effectLst/>
+                <a:latin typeface="+mn-lt"/>
+                <a:ea typeface="+mn-ea"/>
+                <a:cs typeface="+mn-cs"/>
+              </a:rPr>
+              <a:t>The easiest way to move to containers on Azure is to deploy containers to App Service for Containers, however, this option does not provide the typical management tools for container orchestration – that can provide load balancing, dynamic discovery, self-healing, and a holistic approach to container monitoring. </a:t>
+            </a:r>
+          </a:p>
+          <a:p>
+            <a:r>
+              <a:rPr lang="en-US" sz="1200" kern="1200" dirty="0">
+                <a:solidFill>
+                  <a:schemeClr val="tx1"/>
+                </a:solidFill>
+                <a:effectLst/>
+                <a:latin typeface="+mn-lt"/>
+                <a:ea typeface="+mn-ea"/>
+                <a:cs typeface="+mn-cs"/>
+              </a:rPr>
+              <a:t>Azure Container Instances also provide a simple way to manage individual containers without management tooling. </a:t>
+            </a:r>
+          </a:p>
+          <a:p>
+            <a:r>
+              <a:rPr lang="en-US" sz="1200" kern="1200" dirty="0">
+                <a:solidFill>
+                  <a:schemeClr val="tx1"/>
+                </a:solidFill>
+                <a:effectLst/>
+                <a:latin typeface="+mn-lt"/>
+                <a:ea typeface="+mn-ea"/>
+                <a:cs typeface="+mn-cs"/>
+              </a:rPr>
+              <a:t>Ideally, Azure Kubernetes Service (AKS) will provide a fully managed service with the full set of orchestration and management tools – as it evolves. Working with AKS is the best choice to enable migration to AKS while still benefiting from a complete container orchestration experience to support the growth trajectory of the solution.</a:t>
+            </a:r>
+          </a:p>
+          <a:p>
+            <a:endParaRPr lang="en-US" dirty="0"/>
           </a:p>
         </p:txBody>
       </p:sp>
@@ -1661,7 +1725,7 @@
     </p:spTree>
     <p:extLst>
       <p:ext uri="{BB962C8B-B14F-4D97-AF65-F5344CB8AC3E}">
-        <p14:creationId xmlns:p14="http://schemas.microsoft.com/office/powerpoint/2010/main" val="1793785314"/>
+        <p14:creationId xmlns:p14="http://schemas.microsoft.com/office/powerpoint/2010/main" val="4115832635"/>
       </p:ext>
     </p:extLst>
   </p:cSld>
@@ -1725,8 +1789,19 @@
                 <a:ea typeface="+mn-ea"/>
                 <a:cs typeface="+mn-cs"/>
               </a:rPr>
-              <a:t>The easiest way to move to containers on Azure is to deploy containers to App Service for Containers, however, this option does not provide the typical management tools for container orchestration – that can provide load balancing, dynamic discovery, self-healing, and a holistic approach to container monitoring. </a:t>
-            </a:r>
+              <a:t>The best of all worlds is to go with a managed orchestration platform like AKS – native to Azure. It reduces the cost and management overhead of the cluster, while still providing a solution that supports growth, scale, and native management tooling. </a:t>
+            </a:r>
+          </a:p>
+          <a:p>
+            <a:endParaRPr lang="en-US" sz="1200" kern="1200" dirty="0">
+              <a:solidFill>
+                <a:schemeClr val="tx1"/>
+              </a:solidFill>
+              <a:effectLst/>
+              <a:latin typeface="+mn-lt"/>
+              <a:ea typeface="+mn-ea"/>
+              <a:cs typeface="+mn-cs"/>
+            </a:endParaRPr>
           </a:p>
           <a:p>
             <a:r>
@@ -1739,10 +1814,11 @@
                 <a:ea typeface="+mn-ea"/>
                 <a:cs typeface="+mn-cs"/>
               </a:rPr>
-              <a:t>Azure Container Instances also provide a simple way to manage individual containers without management tooling. </a:t>
-            </a:r>
-          </a:p>
-          <a:p>
+              <a:t>With Kubernetes you will have additional features at your fingertips beyond the pure Docker approach including:</a:t>
+            </a:r>
+          </a:p>
+          <a:p>
+            <a:pPr lvl="0" fontAlgn="base"/>
             <a:r>
               <a:rPr lang="en-US" sz="1200" kern="1200" dirty="0">
                 <a:solidFill>
@@ -1753,11 +1829,62 @@
                 <a:ea typeface="+mn-ea"/>
                 <a:cs typeface="+mn-cs"/>
               </a:rPr>
-              <a:t>Ideally, Azure Kubernetes Service (AKS) will provide a fully managed service with the full set of orchestration and management tools – as it evolves. Working with AKS is the best choice to enable migration to AKS while still benefiting from a complete container orchestration experience to support the growth trajectory of the solution.</a:t>
-            </a:r>
-          </a:p>
-          <a:p>
-            <a:endParaRPr lang="en-US" dirty="0"/>
+              <a:t>The Kubernetes management dashboard which includes web interface and remote APIs for managing, running, and scaling containers, including CICD integration options.</a:t>
+            </a:r>
+          </a:p>
+          <a:p>
+            <a:pPr lvl="0" fontAlgn="base"/>
+            <a:r>
+              <a:rPr lang="en-US" sz="1200" kern="1200" dirty="0">
+                <a:solidFill>
+                  <a:schemeClr val="tx1"/>
+                </a:solidFill>
+                <a:effectLst/>
+                <a:latin typeface="+mn-lt"/>
+                <a:ea typeface="+mn-ea"/>
+                <a:cs typeface="+mn-cs"/>
+              </a:rPr>
+              <a:t>The </a:t>
+            </a:r>
+            <a:r>
+              <a:rPr lang="en-US" sz="1200" kern="1200" dirty="0" err="1">
+                <a:solidFill>
+                  <a:schemeClr val="tx1"/>
+                </a:solidFill>
+                <a:effectLst/>
+                <a:latin typeface="+mn-lt"/>
+                <a:ea typeface="+mn-ea"/>
+                <a:cs typeface="+mn-cs"/>
+              </a:rPr>
+              <a:t>kubectl</a:t>
+            </a:r>
+            <a:r>
+              <a:rPr lang="en-US" sz="1200" kern="1200" dirty="0">
+                <a:solidFill>
+                  <a:schemeClr val="tx1"/>
+                </a:solidFill>
+                <a:effectLst/>
+                <a:latin typeface="+mn-lt"/>
+                <a:ea typeface="+mn-ea"/>
+                <a:cs typeface="+mn-cs"/>
+              </a:rPr>
+              <a:t> command line tool for engaging remote Kubernetes APIs and assisting with automation. </a:t>
+            </a:r>
+          </a:p>
+          <a:p>
+            <a:pPr lvl="0" fontAlgn="base"/>
+            <a:r>
+              <a:rPr lang="en-US" sz="1200" kern="1200" dirty="0">
+                <a:solidFill>
+                  <a:schemeClr val="tx1"/>
+                </a:solidFill>
+                <a:effectLst/>
+                <a:latin typeface="+mn-lt"/>
+                <a:ea typeface="+mn-ea"/>
+                <a:cs typeface="+mn-cs"/>
+              </a:rPr>
+              <a:t>Built-in dynamic service discovery simplifying the deployment of new container instances to a load balanced environment. </a:t>
+            </a:r>
           </a:p>
         </p:txBody>
       </p:sp>
@@ -1787,7 +1914,7 @@
     </p:spTree>
     <p:extLst>
       <p:ext uri="{BB962C8B-B14F-4D97-AF65-F5344CB8AC3E}">
-        <p14:creationId xmlns:p14="http://schemas.microsoft.com/office/powerpoint/2010/main" val="4115832635"/>
+        <p14:creationId xmlns:p14="http://schemas.microsoft.com/office/powerpoint/2010/main" val="1806888693"/>
       </p:ext>
     </p:extLst>
   </p:cSld>
@@ -1841,112 +1968,7 @@
           <a:bodyPr/>
           <a:lstStyle/>
           <a:p>
-            <a:r>
-              <a:rPr lang="en-US" sz="1200" kern="1200" dirty="0">
-                <a:solidFill>
-                  <a:schemeClr val="tx1"/>
-                </a:solidFill>
-                <a:effectLst/>
-                <a:latin typeface="+mn-lt"/>
-                <a:ea typeface="+mn-ea"/>
-                <a:cs typeface="+mn-cs"/>
-              </a:rPr>
-              <a:t>The best of all worlds is to go with a managed orchestration platform like AKS – native to Azure. It reduces the cost and management overhead of the cluster, while still providing a solution that supports growth, scale, and native management tooling. </a:t>
-            </a:r>
-          </a:p>
-          <a:p>
-            <a:endParaRPr lang="en-US" sz="1200" kern="1200" dirty="0">
-              <a:solidFill>
-                <a:schemeClr val="tx1"/>
-              </a:solidFill>
-              <a:effectLst/>
-              <a:latin typeface="+mn-lt"/>
-              <a:ea typeface="+mn-ea"/>
-              <a:cs typeface="+mn-cs"/>
-            </a:endParaRPr>
-          </a:p>
-          <a:p>
-            <a:r>
-              <a:rPr lang="en-US" sz="1200" kern="1200" dirty="0">
-                <a:solidFill>
-                  <a:schemeClr val="tx1"/>
-                </a:solidFill>
-                <a:effectLst/>
-                <a:latin typeface="+mn-lt"/>
-                <a:ea typeface="+mn-ea"/>
-                <a:cs typeface="+mn-cs"/>
-              </a:rPr>
-              <a:t>With Kubernetes you will have additional features at your fingertips beyond the pure Docker approach including:</a:t>
-            </a:r>
-          </a:p>
-          <a:p>
-            <a:pPr lvl="0" fontAlgn="base"/>
-            <a:r>
-              <a:rPr lang="en-US" sz="1200" kern="1200" dirty="0">
-                <a:solidFill>
-                  <a:schemeClr val="tx1"/>
-                </a:solidFill>
-                <a:effectLst/>
-                <a:latin typeface="+mn-lt"/>
-                <a:ea typeface="+mn-ea"/>
-                <a:cs typeface="+mn-cs"/>
-              </a:rPr>
-              <a:t>The Kubernetes management dashboard which includes web interface and remote APIs for managing, running, and scaling containers, including CICD integration options.</a:t>
-            </a:r>
-          </a:p>
-          <a:p>
-            <a:pPr lvl="0" fontAlgn="base"/>
-            <a:r>
-              <a:rPr lang="en-US" sz="1200" kern="1200" dirty="0">
-                <a:solidFill>
-                  <a:schemeClr val="tx1"/>
-                </a:solidFill>
-                <a:effectLst/>
-                <a:latin typeface="+mn-lt"/>
-                <a:ea typeface="+mn-ea"/>
-                <a:cs typeface="+mn-cs"/>
-              </a:rPr>
-              <a:t>The </a:t>
-            </a:r>
-            <a:r>
-              <a:rPr lang="en-US" sz="1200" kern="1200" dirty="0" err="1">
-                <a:solidFill>
-                  <a:schemeClr val="tx1"/>
-                </a:solidFill>
-                <a:effectLst/>
-                <a:latin typeface="+mn-lt"/>
-                <a:ea typeface="+mn-ea"/>
-                <a:cs typeface="+mn-cs"/>
-              </a:rPr>
-              <a:t>kubectl</a:t>
-            </a:r>
-            <a:r>
-              <a:rPr lang="en-US" sz="1200" kern="1200" dirty="0">
-                <a:solidFill>
-                  <a:schemeClr val="tx1"/>
-                </a:solidFill>
-                <a:effectLst/>
-                <a:latin typeface="+mn-lt"/>
-                <a:ea typeface="+mn-ea"/>
-                <a:cs typeface="+mn-cs"/>
-              </a:rPr>
-              <a:t> command line tool for engaging remote Kubernetes APIs and assisting with automation. </a:t>
-            </a:r>
-          </a:p>
-          <a:p>
-            <a:pPr lvl="0" fontAlgn="base"/>
-            <a:r>
-              <a:rPr lang="en-US" sz="1200" kern="1200" dirty="0">
-                <a:solidFill>
-                  <a:schemeClr val="tx1"/>
-                </a:solidFill>
-                <a:effectLst/>
-                <a:latin typeface="+mn-lt"/>
-                <a:ea typeface="+mn-ea"/>
-                <a:cs typeface="+mn-cs"/>
-              </a:rPr>
-              <a:t>Built-in dynamic service discovery simplifying the deployment of new container instances to a load balanced environment. </a:t>
-            </a:r>
+            <a:endParaRPr lang="en-US" dirty="0"/>
           </a:p>
         </p:txBody>
       </p:sp>
@@ -1976,7 +1998,7 @@
     </p:spTree>
     <p:extLst>
       <p:ext uri="{BB962C8B-B14F-4D97-AF65-F5344CB8AC3E}">
-        <p14:creationId xmlns:p14="http://schemas.microsoft.com/office/powerpoint/2010/main" val="1806888693"/>
+        <p14:creationId xmlns:p14="http://schemas.microsoft.com/office/powerpoint/2010/main" val="671285550"/>
       </p:ext>
     </p:extLst>
   </p:cSld>
@@ -1987,90 +2009,6 @@
 </file>
 
 <file path=ppt/notesSlides/notesSlide23.xml><?xml version="1.0" encoding="utf-8"?>
-<p:notes xmlns:a="http://schemas.openxmlformats.org/drawingml/2006/main" xmlns:r="http://schemas.openxmlformats.org/officeDocument/2006/relationships" xmlns:p="http://schemas.openxmlformats.org/presentationml/2006/main">
-  <p:cSld>
-    <p:spTree>
-      <p:nvGrpSpPr>
-        <p:cNvPr id="1" name=""/>
-        <p:cNvGrpSpPr/>
-        <p:nvPr/>
-      </p:nvGrpSpPr>
-      <p:grpSpPr>
-        <a:xfrm>
-          <a:off x="0" y="0"/>
-          <a:ext cx="0" cy="0"/>
-          <a:chOff x="0" y="0"/>
-          <a:chExt cx="0" cy="0"/>
-        </a:xfrm>
-      </p:grpSpPr>
-      <p:sp>
-        <p:nvSpPr>
-          <p:cNvPr id="2" name="Slide Image Placeholder 1"/>
-          <p:cNvSpPr>
-            <a:spLocks noGrp="1" noRot="1" noChangeAspect="1"/>
-          </p:cNvSpPr>
-          <p:nvPr>
-            <p:ph type="sldImg"/>
-          </p:nvPr>
-        </p:nvSpPr>
-        <p:spPr/>
-      </p:sp>
-      <p:sp>
-        <p:nvSpPr>
-          <p:cNvPr id="3" name="Notes Placeholder 2"/>
-          <p:cNvSpPr>
-            <a:spLocks noGrp="1"/>
-          </p:cNvSpPr>
-          <p:nvPr>
-            <p:ph type="body" idx="1"/>
-          </p:nvPr>
-        </p:nvSpPr>
-        <p:spPr/>
-        <p:txBody>
-          <a:bodyPr/>
-          <a:lstStyle/>
-          <a:p>
-            <a:endParaRPr lang="en-US" dirty="0"/>
-          </a:p>
-        </p:txBody>
-      </p:sp>
-      <p:sp>
-        <p:nvSpPr>
-          <p:cNvPr id="4" name="Slide Number Placeholder 3"/>
-          <p:cNvSpPr>
-            <a:spLocks noGrp="1"/>
-          </p:cNvSpPr>
-          <p:nvPr>
-            <p:ph type="sldNum" sz="quarter" idx="10"/>
-          </p:nvPr>
-        </p:nvSpPr>
-        <p:spPr/>
-        <p:txBody>
-          <a:bodyPr/>
-          <a:lstStyle/>
-          <a:p>
-            <a:fld id="{0998D5BB-B127-481F-BC0A-2F77C576BB34}" type="slidenum">
-              <a:rPr lang="en-US" smtClean="0"/>
-              <a:t>23</a:t>
-            </a:fld>
-            <a:endParaRPr lang="en-US"/>
-          </a:p>
-        </p:txBody>
-      </p:sp>
-    </p:spTree>
-    <p:extLst>
-      <p:ext uri="{BB962C8B-B14F-4D97-AF65-F5344CB8AC3E}">
-        <p14:creationId xmlns:p14="http://schemas.microsoft.com/office/powerpoint/2010/main" val="671285550"/>
-      </p:ext>
-    </p:extLst>
-  </p:cSld>
-  <p:clrMapOvr>
-    <a:masterClrMapping/>
-  </p:clrMapOvr>
-</p:notes>
-</file>
-
-<file path=ppt/notesSlides/notesSlide24.xml><?xml version="1.0" encoding="utf-8"?>
 <p:notes xmlns:a="http://schemas.openxmlformats.org/drawingml/2006/main" xmlns:r="http://schemas.openxmlformats.org/officeDocument/2006/relationships" xmlns:p="http://schemas.openxmlformats.org/presentationml/2006/main">
   <p:cSld>
     <p:spTree>
@@ -2177,7 +2115,7 @@
                   <a:prstClr val="black"/>
                 </a:solidFill>
               </a:rPr>
-              <a:t>10/21/2018 12:50 PM</a:t>
+              <a:t>4/14/19 5:58 PM</a:t>
             </a:fld>
             <a:endParaRPr lang="en-US" dirty="0">
               <a:solidFill>
@@ -2209,7 +2147,7 @@
                 </a:solidFill>
               </a:rPr>
               <a:pPr/>
-              <a:t>24</a:t>
+              <a:t>23</a:t>
             </a:fld>
             <a:endParaRPr lang="en-US" dirty="0">
               <a:solidFill>
@@ -15025,6 +14963,191 @@
       </p:grpSpPr>
       <p:sp>
         <p:nvSpPr>
+          <p:cNvPr id="3" name="Content Placeholder 2"/>
+          <p:cNvSpPr>
+            <a:spLocks noGrp="1"/>
+          </p:cNvSpPr>
+          <p:nvPr>
+            <p:ph type="body" sz="quarter" idx="10"/>
+          </p:nvPr>
+        </p:nvSpPr>
+        <p:spPr>
+          <a:xfrm>
+            <a:off x="269240" y="1104116"/>
+            <a:ext cx="11653523" cy="5613676"/>
+          </a:xfrm>
+        </p:spPr>
+        <p:txBody>
+          <a:bodyPr>
+            <a:noAutofit/>
+          </a:bodyPr>
+          <a:lstStyle/>
+          <a:p>
+            <a:pPr lvl="1">
+              <a:spcAft>
+                <a:spcPts val="882"/>
+              </a:spcAft>
+            </a:pPr>
+            <a:r>
+              <a:rPr lang="en-US" sz="2800" dirty="0">
+                <a:solidFill>
+                  <a:schemeClr val="tx1"/>
+                </a:solidFill>
+                <a:latin typeface="+mj-lt"/>
+              </a:rPr>
+              <a:t>Simplify new tenant deployment</a:t>
+            </a:r>
+          </a:p>
+          <a:p>
+            <a:pPr lvl="1">
+              <a:spcAft>
+                <a:spcPts val="882"/>
+              </a:spcAft>
+            </a:pPr>
+            <a:r>
+              <a:rPr lang="en-US" sz="2800" dirty="0">
+                <a:solidFill>
+                  <a:schemeClr val="tx1"/>
+                </a:solidFill>
+                <a:latin typeface="+mj-lt"/>
+              </a:rPr>
+              <a:t>Improve reliability of tenant updates</a:t>
+            </a:r>
+          </a:p>
+          <a:p>
+            <a:pPr lvl="1">
+              <a:spcAft>
+                <a:spcPts val="882"/>
+              </a:spcAft>
+            </a:pPr>
+            <a:r>
+              <a:rPr lang="en-US" sz="2800" dirty="0">
+                <a:solidFill>
+                  <a:schemeClr val="tx1"/>
+                </a:solidFill>
+                <a:latin typeface="+mj-lt"/>
+              </a:rPr>
+              <a:t>Choose a suitable Docker container strategy on Azure</a:t>
+            </a:r>
+          </a:p>
+          <a:p>
+            <a:pPr lvl="1">
+              <a:spcAft>
+                <a:spcPts val="882"/>
+              </a:spcAft>
+            </a:pPr>
+            <a:r>
+              <a:rPr lang="en-US" sz="2800" dirty="0">
+                <a:solidFill>
+                  <a:schemeClr val="tx1"/>
+                </a:solidFill>
+                <a:latin typeface="+mj-lt"/>
+              </a:rPr>
+              <a:t>Migrate MongoDB data to Cosmos DB without application changes</a:t>
+            </a:r>
+          </a:p>
+          <a:p>
+            <a:pPr lvl="1">
+              <a:spcAft>
+                <a:spcPts val="882"/>
+              </a:spcAft>
+            </a:pPr>
+            <a:r>
+              <a:rPr lang="en-US" sz="2800" dirty="0">
+                <a:solidFill>
+                  <a:schemeClr val="tx1"/>
+                </a:solidFill>
+                <a:latin typeface="+mj-lt"/>
+              </a:rPr>
+              <a:t>Continue to use Git repositories for source control</a:t>
+            </a:r>
+          </a:p>
+          <a:p>
+            <a:pPr lvl="1">
+              <a:spcAft>
+                <a:spcPts val="882"/>
+              </a:spcAft>
+            </a:pPr>
+            <a:r>
+              <a:rPr lang="en-US" sz="2800" dirty="0">
+                <a:solidFill>
+                  <a:schemeClr val="tx1"/>
+                </a:solidFill>
+                <a:latin typeface="+mj-lt"/>
+              </a:rPr>
+              <a:t>Look at Azure DevOps as the CICD tool of choice</a:t>
+            </a:r>
+          </a:p>
+          <a:p>
+            <a:pPr lvl="1">
+              <a:spcAft>
+                <a:spcPts val="882"/>
+              </a:spcAft>
+            </a:pPr>
+            <a:r>
+              <a:rPr lang="en-US" sz="2800" dirty="0">
+                <a:solidFill>
+                  <a:schemeClr val="tx1"/>
+                </a:solidFill>
+                <a:latin typeface="+mj-lt"/>
+              </a:rPr>
+              <a:t>Use tools for deployment, CICD integration, container scheduling, orchestration, monitoring, and alerts</a:t>
+            </a:r>
+          </a:p>
+          <a:p>
+            <a:pPr lvl="1">
+              <a:spcAft>
+                <a:spcPts val="882"/>
+              </a:spcAft>
+            </a:pPr>
+            <a:r>
+              <a:rPr lang="en-US" sz="2800" dirty="0">
+                <a:latin typeface="+mj-lt"/>
+              </a:rPr>
+              <a:t>They wish to complete an implementation of the proposed solution for a single tenant to train the team and perfect the process</a:t>
+            </a:r>
+          </a:p>
+          <a:p>
+            <a:pPr marL="236546" lvl="1" indent="0">
+              <a:spcAft>
+                <a:spcPts val="882"/>
+              </a:spcAft>
+              <a:buNone/>
+            </a:pPr>
+            <a:endParaRPr lang="en-US" sz="2800" dirty="0">
+              <a:solidFill>
+                <a:schemeClr val="tx1"/>
+              </a:solidFill>
+            </a:endParaRPr>
+          </a:p>
+          <a:p>
+            <a:pPr>
+              <a:spcAft>
+                <a:spcPts val="882"/>
+              </a:spcAft>
+            </a:pPr>
+            <a:endParaRPr lang="en-US" sz="3600" dirty="0">
+              <a:solidFill>
+                <a:schemeClr val="tx1"/>
+              </a:solidFill>
+            </a:endParaRPr>
+          </a:p>
+          <a:p>
+            <a:pPr>
+              <a:spcAft>
+                <a:spcPts val="882"/>
+              </a:spcAft>
+            </a:pPr>
+            <a:endParaRPr lang="en-US" sz="3600" dirty="0">
+              <a:solidFill>
+                <a:schemeClr val="tx1"/>
+              </a:solidFill>
+            </a:endParaRPr>
+          </a:p>
+        </p:txBody>
+      </p:sp>
+      <p:sp>
+        <p:nvSpPr>
           <p:cNvPr id="2" name="Title 1"/>
           <p:cNvSpPr>
             <a:spLocks noGrp="1"/>
@@ -15047,7 +15170,7 @@
                 </a:solidFill>
                 <a:cs typeface="Segoe UI" panose="020B0502040204020203" pitchFamily="34" charset="0"/>
               </a:rPr>
-              <a:t>Customer situation</a:t>
+              <a:t>Customer needs</a:t>
             </a:r>
             <a:br>
               <a:rPr lang="en-US" dirty="0">
@@ -15066,175 +15189,10 @@
           </a:p>
         </p:txBody>
       </p:sp>
-      <p:pic>
-        <p:nvPicPr>
-          <p:cNvPr id="4" name="Graphic 3" descr="Speech icon">
-            <a:extLst>
-              <a:ext uri="{FF2B5EF4-FFF2-40B4-BE49-F238E27FC236}">
-                <a16:creationId xmlns:a16="http://schemas.microsoft.com/office/drawing/2014/main" id="{60170A7D-EFEA-4F34-A44E-57F33E6E6E4C}"/>
-              </a:ext>
-            </a:extLst>
-          </p:cNvPr>
-          <p:cNvPicPr>
-            <a:picLocks noChangeAspect="1"/>
-          </p:cNvPicPr>
-          <p:nvPr/>
-        </p:nvPicPr>
-        <p:blipFill>
-          <a:blip r:embed="rId3">
-            <a:extLst>
-              <a:ext uri="{28A0092B-C50C-407E-A947-70E740481C1C}">
-                <a14:useLocalDpi xmlns:a14="http://schemas.microsoft.com/office/drawing/2010/main" val="0"/>
-              </a:ext>
-              <a:ext uri="{96DAC541-7B7A-43D3-8B79-37D633B846F1}">
-                <asvg:svgBlip xmlns:asvg="http://schemas.microsoft.com/office/drawing/2016/SVG/main" r:embed="rId4"/>
-              </a:ext>
-            </a:extLst>
-          </a:blip>
-          <a:stretch>
-            <a:fillRect/>
-          </a:stretch>
-        </p:blipFill>
-        <p:spPr>
-          <a:xfrm>
-            <a:off x="7538061" y="3451333"/>
-            <a:ext cx="4387019" cy="2584774"/>
-          </a:xfrm>
-          <a:prstGeom prst="rect">
-            <a:avLst/>
-          </a:prstGeom>
-          <a:effectLst>
-            <a:outerShdw blurRad="76200" dir="18900000" sy="23000" kx="-1200000" algn="bl" rotWithShape="0">
-              <a:prstClr val="black">
-                <a:alpha val="20000"/>
-              </a:prstClr>
-            </a:outerShdw>
-          </a:effectLst>
-        </p:spPr>
-      </p:pic>
-      <p:sp>
-        <p:nvSpPr>
-          <p:cNvPr id="5" name="Rectangle 4">
-            <a:extLst>
-              <a:ext uri="{FF2B5EF4-FFF2-40B4-BE49-F238E27FC236}">
-                <a16:creationId xmlns:a16="http://schemas.microsoft.com/office/drawing/2014/main" id="{2B501E50-FCD1-41FD-B048-2DA4E541EB12}"/>
-              </a:ext>
-            </a:extLst>
-          </p:cNvPr>
-          <p:cNvSpPr/>
-          <p:nvPr/>
-        </p:nvSpPr>
-        <p:spPr>
-          <a:xfrm>
-            <a:off x="269240" y="1189176"/>
-            <a:ext cx="8885393" cy="4524315"/>
-          </a:xfrm>
-          <a:prstGeom prst="rect">
-            <a:avLst/>
-          </a:prstGeom>
-        </p:spPr>
-        <p:txBody>
-          <a:bodyPr wrap="square">
-            <a:spAutoFit/>
-          </a:bodyPr>
-          <a:lstStyle/>
-          <a:p>
-            <a:r>
-              <a:rPr lang="en-US" sz="3600" dirty="0">
-                <a:latin typeface="+mj-lt"/>
-              </a:rPr>
-              <a:t>These are the key challenges we want </a:t>
-            </a:r>
-            <a:br>
-              <a:rPr lang="en-US" sz="3600" dirty="0">
-                <a:latin typeface="+mj-lt"/>
-              </a:rPr>
-            </a:br>
-            <a:r>
-              <a:rPr lang="en-US" sz="3600" dirty="0">
-                <a:latin typeface="+mj-lt"/>
-              </a:rPr>
-              <a:t>to resolve:</a:t>
-            </a:r>
-          </a:p>
-          <a:p>
-            <a:pPr marL="742950" lvl="1" indent="-285750">
-              <a:buFont typeface="Arial" panose="020B0604020202020204" pitchFamily="34" charset="0"/>
-              <a:buChar char="•"/>
-            </a:pPr>
-            <a:r>
-              <a:rPr lang="en-US" sz="2400" dirty="0"/>
-              <a:t>Reduce potential for regressions when changes are made to each tenant code base</a:t>
-            </a:r>
-          </a:p>
-          <a:p>
-            <a:pPr marL="742950" lvl="1" indent="-285750">
-              <a:buFont typeface="Arial" panose="020B0604020202020204" pitchFamily="34" charset="0"/>
-              <a:buChar char="•"/>
-            </a:pPr>
-            <a:r>
-              <a:rPr lang="en-US" sz="2400" dirty="0"/>
-              <a:t>Reduce the coverage required as new features are rolled </a:t>
-            </a:r>
-            <a:br>
-              <a:rPr lang="en-US" sz="2400" dirty="0"/>
-            </a:br>
-            <a:r>
-              <a:rPr lang="en-US" sz="2400" dirty="0"/>
-              <a:t>out in different areas</a:t>
-            </a:r>
-          </a:p>
-          <a:p>
-            <a:pPr marL="742950" lvl="1" indent="-285750">
-              <a:buFont typeface="Arial" panose="020B0604020202020204" pitchFamily="34" charset="0"/>
-              <a:buChar char="•"/>
-            </a:pPr>
-            <a:r>
-              <a:rPr lang="en-US" sz="2400" dirty="0"/>
-              <a:t>Reduce the time to onboard new tenants</a:t>
-            </a:r>
-          </a:p>
-          <a:p>
-            <a:pPr marL="742950" lvl="1" indent="-285750">
-              <a:buFont typeface="Arial" panose="020B0604020202020204" pitchFamily="34" charset="0"/>
-              <a:buChar char="•"/>
-            </a:pPr>
-            <a:r>
-              <a:rPr lang="en-US" sz="2400" dirty="0"/>
-              <a:t>Reduce overhead managing changes, and related deployments</a:t>
-            </a:r>
-          </a:p>
-          <a:p>
-            <a:pPr marL="742950" lvl="1" indent="-285750">
-              <a:buFont typeface="Arial" panose="020B0604020202020204" pitchFamily="34" charset="0"/>
-              <a:buChar char="•"/>
-            </a:pPr>
-            <a:r>
-              <a:rPr lang="en-US" sz="2400" dirty="0"/>
-              <a:t>Improve ability to roll back or forward quickly</a:t>
-            </a:r>
-          </a:p>
-          <a:p>
-            <a:pPr marL="742950" lvl="1" indent="-285750">
-              <a:buFont typeface="Arial" panose="020B0604020202020204" pitchFamily="34" charset="0"/>
-              <a:buChar char="•"/>
-            </a:pPr>
-            <a:r>
-              <a:rPr lang="en-US" sz="2400" dirty="0"/>
-              <a:t>Improve visibility into overall operations </a:t>
-            </a:r>
-            <a:r>
-              <a:rPr lang="en-US" sz="2400"/>
-              <a:t>and health</a:t>
-            </a:r>
-            <a:endParaRPr lang="en-US" sz="2400" dirty="0"/>
-          </a:p>
-        </p:txBody>
-      </p:sp>
     </p:spTree>
     <p:extLst>
       <p:ext uri="{BB962C8B-B14F-4D97-AF65-F5344CB8AC3E}">
-        <p14:creationId xmlns:p14="http://schemas.microsoft.com/office/powerpoint/2010/main" val="1571028754"/>
+        <p14:creationId xmlns:p14="http://schemas.microsoft.com/office/powerpoint/2010/main" val="3715887035"/>
       </p:ext>
     </p:extLst>
   </p:cSld>
@@ -15271,272 +15229,6 @@
       </p:grpSpPr>
       <p:sp>
         <p:nvSpPr>
-          <p:cNvPr id="3" name="Content Placeholder 2"/>
-          <p:cNvSpPr>
-            <a:spLocks noGrp="1"/>
-          </p:cNvSpPr>
-          <p:nvPr>
-            <p:ph type="body" sz="quarter" idx="10"/>
-          </p:nvPr>
-        </p:nvSpPr>
-        <p:spPr>
-          <a:xfrm>
-            <a:off x="269240" y="1104116"/>
-            <a:ext cx="11653523" cy="2052030"/>
-          </a:xfrm>
-        </p:spPr>
-        <p:txBody>
-          <a:bodyPr>
-            <a:noAutofit/>
-          </a:bodyPr>
-          <a:lstStyle/>
-          <a:p>
-            <a:pPr lvl="1">
-              <a:spcAft>
-                <a:spcPts val="882"/>
-              </a:spcAft>
-            </a:pPr>
-            <a:r>
-              <a:rPr lang="en-US" sz="2800" dirty="0">
-                <a:solidFill>
-                  <a:schemeClr val="tx1"/>
-                </a:solidFill>
-                <a:latin typeface="+mj-lt"/>
-              </a:rPr>
-              <a:t>Simplify new tenant deployment</a:t>
-            </a:r>
-          </a:p>
-          <a:p>
-            <a:pPr lvl="1">
-              <a:spcAft>
-                <a:spcPts val="882"/>
-              </a:spcAft>
-            </a:pPr>
-            <a:r>
-              <a:rPr lang="en-US" sz="2800" dirty="0">
-                <a:solidFill>
-                  <a:schemeClr val="tx1"/>
-                </a:solidFill>
-                <a:latin typeface="+mj-lt"/>
-              </a:rPr>
-              <a:t>Improve reliability of tenant updates</a:t>
-            </a:r>
-          </a:p>
-          <a:p>
-            <a:pPr lvl="1">
-              <a:spcAft>
-                <a:spcPts val="882"/>
-              </a:spcAft>
-            </a:pPr>
-            <a:r>
-              <a:rPr lang="en-US" sz="2800" dirty="0">
-                <a:solidFill>
-                  <a:schemeClr val="tx1"/>
-                </a:solidFill>
-                <a:latin typeface="+mj-lt"/>
-              </a:rPr>
-              <a:t>Choose a suitable Docker container strategy on Azure</a:t>
-            </a:r>
-          </a:p>
-          <a:p>
-            <a:pPr lvl="1">
-              <a:spcAft>
-                <a:spcPts val="882"/>
-              </a:spcAft>
-            </a:pPr>
-            <a:r>
-              <a:rPr lang="en-US" sz="2800" dirty="0">
-                <a:solidFill>
-                  <a:schemeClr val="tx1"/>
-                </a:solidFill>
-                <a:latin typeface="+mj-lt"/>
-              </a:rPr>
-              <a:t>Migrate MongoDB data to Cosmos DB without application changes</a:t>
-            </a:r>
-          </a:p>
-          <a:p>
-            <a:pPr lvl="1">
-              <a:spcAft>
-                <a:spcPts val="882"/>
-              </a:spcAft>
-            </a:pPr>
-            <a:r>
-              <a:rPr lang="en-US" sz="2800" dirty="0">
-                <a:solidFill>
-                  <a:schemeClr val="tx1"/>
-                </a:solidFill>
-                <a:latin typeface="+mj-lt"/>
-              </a:rPr>
-              <a:t>Continue to use Git repositories for source control</a:t>
-            </a:r>
-          </a:p>
-          <a:p>
-            <a:pPr lvl="1">
-              <a:spcAft>
-                <a:spcPts val="882"/>
-              </a:spcAft>
-            </a:pPr>
-            <a:r>
-              <a:rPr lang="en-US" sz="2800" dirty="0">
-                <a:solidFill>
-                  <a:schemeClr val="tx1"/>
-                </a:solidFill>
-                <a:latin typeface="+mj-lt"/>
-              </a:rPr>
-              <a:t>Look at Azure DevOps as the CICD tool of choice</a:t>
-            </a:r>
-          </a:p>
-          <a:p>
-            <a:pPr lvl="1">
-              <a:spcAft>
-                <a:spcPts val="882"/>
-              </a:spcAft>
-            </a:pPr>
-            <a:r>
-              <a:rPr lang="en-US" sz="2800" dirty="0">
-                <a:solidFill>
-                  <a:schemeClr val="tx1"/>
-                </a:solidFill>
-                <a:latin typeface="+mj-lt"/>
-              </a:rPr>
-              <a:t>Use tools for deployment, CICD integration, container scheduling, orchestration, monitoring, and alerts</a:t>
-            </a:r>
-          </a:p>
-          <a:p>
-            <a:pPr lvl="1">
-              <a:spcAft>
-                <a:spcPts val="882"/>
-              </a:spcAft>
-            </a:pPr>
-            <a:r>
-              <a:rPr lang="en-US" sz="2800" dirty="0">
-                <a:latin typeface="+mj-lt"/>
-              </a:rPr>
-              <a:t>They wish to complete an implementation of the proposed solution for a single tenant to train the team and perfect the process</a:t>
-            </a:r>
-          </a:p>
-          <a:p>
-            <a:pPr marL="236546" lvl="1" indent="0">
-              <a:spcAft>
-                <a:spcPts val="882"/>
-              </a:spcAft>
-              <a:buNone/>
-            </a:pPr>
-            <a:endParaRPr lang="en-US" sz="2800" dirty="0">
-              <a:solidFill>
-                <a:schemeClr val="tx1"/>
-              </a:solidFill>
-            </a:endParaRPr>
-          </a:p>
-          <a:p>
-            <a:pPr>
-              <a:spcAft>
-                <a:spcPts val="882"/>
-              </a:spcAft>
-            </a:pPr>
-            <a:endParaRPr lang="en-US" sz="3600" dirty="0">
-              <a:solidFill>
-                <a:schemeClr val="tx1"/>
-              </a:solidFill>
-            </a:endParaRPr>
-          </a:p>
-          <a:p>
-            <a:pPr>
-              <a:spcAft>
-                <a:spcPts val="882"/>
-              </a:spcAft>
-            </a:pPr>
-            <a:endParaRPr lang="en-US" sz="3600" dirty="0">
-              <a:solidFill>
-                <a:schemeClr val="tx1"/>
-              </a:solidFill>
-            </a:endParaRPr>
-          </a:p>
-        </p:txBody>
-      </p:sp>
-      <p:sp>
-        <p:nvSpPr>
-          <p:cNvPr id="2" name="Title 1"/>
-          <p:cNvSpPr>
-            <a:spLocks noGrp="1"/>
-          </p:cNvSpPr>
-          <p:nvPr>
-            <p:ph type="title"/>
-          </p:nvPr>
-        </p:nvSpPr>
-        <p:spPr/>
-        <p:txBody>
-          <a:bodyPr>
-            <a:normAutofit fontScale="90000"/>
-          </a:bodyPr>
-          <a:lstStyle/>
-          <a:p>
-            <a:r>
-              <a:rPr lang="en-US" sz="4900" dirty="0">
-                <a:solidFill>
-                  <a:schemeClr val="tx1"/>
-                </a:solidFill>
-                <a:cs typeface="Segoe UI" panose="020B0502040204020203" pitchFamily="34" charset="0"/>
-              </a:rPr>
-              <a:t>Customer needs</a:t>
-            </a:r>
-            <a:br>
-              <a:rPr lang="en-US" dirty="0">
-                <a:solidFill>
-                  <a:schemeClr val="tx1"/>
-                </a:solidFill>
-                <a:latin typeface="Segoe UI" panose="020B0502040204020203" pitchFamily="34" charset="0"/>
-              </a:rPr>
-            </a:br>
-            <a:endParaRPr lang="en-US" sz="3236" dirty="0">
-              <a:solidFill>
-                <a:schemeClr val="tx1"/>
-              </a:solidFill>
-              <a:latin typeface="Segoe UI" panose="020B0502040204020203" pitchFamily="34" charset="0"/>
-            </a:endParaRPr>
-          </a:p>
-        </p:txBody>
-      </p:sp>
-    </p:spTree>
-    <p:extLst>
-      <p:ext uri="{BB962C8B-B14F-4D97-AF65-F5344CB8AC3E}">
-        <p14:creationId xmlns:p14="http://schemas.microsoft.com/office/powerpoint/2010/main" val="3715887035"/>
-      </p:ext>
-    </p:extLst>
-  </p:cSld>
-  <p:clrMapOvr>
-    <a:masterClrMapping/>
-  </p:clrMapOvr>
-  <mc:AlternateContent xmlns:mc="http://schemas.openxmlformats.org/markup-compatibility/2006" xmlns:p14="http://schemas.microsoft.com/office/powerpoint/2010/main">
-    <mc:Choice Requires="p14">
-      <p:transition p14:dur="0"/>
-    </mc:Choice>
-    <mc:Fallback xmlns="">
-      <p:transition/>
-    </mc:Fallback>
-  </mc:AlternateContent>
-</p:sld>
-</file>
-
-<file path=ppt/slides/slide12.xml><?xml version="1.0" encoding="utf-8"?>
-<p:sld xmlns:a="http://schemas.openxmlformats.org/drawingml/2006/main" xmlns:r="http://schemas.openxmlformats.org/officeDocument/2006/relationships" xmlns:p="http://schemas.openxmlformats.org/presentationml/2006/main">
-  <p:cSld>
-    <p:spTree>
-      <p:nvGrpSpPr>
-        <p:cNvPr id="1" name=""/>
-        <p:cNvGrpSpPr/>
-        <p:nvPr/>
-      </p:nvGrpSpPr>
-      <p:grpSpPr>
-        <a:xfrm>
-          <a:off x="0" y="0"/>
-          <a:ext cx="0" cy="0"/>
-          <a:chOff x="0" y="0"/>
-          <a:chExt cx="0" cy="0"/>
-        </a:xfrm>
-      </p:grpSpPr>
-      <p:sp>
-        <p:nvSpPr>
           <p:cNvPr id="2" name="Title 1"/>
           <p:cNvSpPr>
             <a:spLocks noGrp="1"/>
@@ -15607,12 +15299,8 @@
             </a:pPr>
             <a:r>
               <a:rPr lang="en-US" sz="3600" b="1" dirty="0"/>
-              <a:t>With so many platforms and tools for Docker and container orchestration, how should we choose an option for Azure?</a:t>
-            </a:r>
-            <a:br>
-              <a:rPr lang="en-US" sz="3600" b="1" dirty="0"/>
-            </a:br>
-            <a:endParaRPr lang="en-US" sz="2000" b="1" dirty="0"/>
+              <a:t>There are many ways to deploy Docker containers on Azure, how do those options compare and what are motivations for each?</a:t>
+            </a:r>
           </a:p>
           <a:p>
             <a:pPr lvl="0" fontAlgn="base">
@@ -15620,9 +15308,17 @@
                 <a:tab pos="3200400" algn="l"/>
               </a:tabLst>
             </a:pPr>
+            <a:endParaRPr lang="en-US" sz="3600" b="1" dirty="0"/>
+          </a:p>
+          <a:p>
+            <a:pPr lvl="0" fontAlgn="base">
+              <a:tabLst>
+                <a:tab pos="3200400" algn="l"/>
+              </a:tabLst>
+            </a:pPr>
             <a:r>
               <a:rPr lang="en-US" sz="3600" b="1" dirty="0"/>
-              <a:t>What is the simplest way to move containers on Azure, based on our PaaS experience, while at the same time considering our scale and growth requirements?</a:t>
+              <a:t>Is there a PaaS option in Azure that also provides the full container orchestration platform options, that would be easy to migrate to but also handle our scale and management requirements?</a:t>
             </a:r>
           </a:p>
         </p:txBody>
@@ -15687,6 +15383,154 @@
 </p:sld>
 </file>
 
+<file path=ppt/slides/slide12.xml><?xml version="1.0" encoding="utf-8"?>
+<p:sld xmlns:a="http://schemas.openxmlformats.org/drawingml/2006/main" xmlns:r="http://schemas.openxmlformats.org/officeDocument/2006/relationships" xmlns:p="http://schemas.openxmlformats.org/presentationml/2006/main">
+  <p:cSld>
+    <p:spTree>
+      <p:nvGrpSpPr>
+        <p:cNvPr id="1" name=""/>
+        <p:cNvGrpSpPr/>
+        <p:nvPr/>
+      </p:nvGrpSpPr>
+      <p:grpSpPr>
+        <a:xfrm>
+          <a:off x="0" y="0"/>
+          <a:ext cx="0" cy="0"/>
+          <a:chOff x="0" y="0"/>
+          <a:chExt cx="0" cy="0"/>
+        </a:xfrm>
+      </p:grpSpPr>
+      <p:sp>
+        <p:nvSpPr>
+          <p:cNvPr id="2" name="Title 1"/>
+          <p:cNvSpPr>
+            <a:spLocks noGrp="1"/>
+          </p:cNvSpPr>
+          <p:nvPr>
+            <p:ph type="title"/>
+          </p:nvPr>
+        </p:nvSpPr>
+        <p:spPr/>
+        <p:txBody>
+          <a:bodyPr>
+            <a:normAutofit fontScale="90000"/>
+          </a:bodyPr>
+          <a:lstStyle/>
+          <a:p>
+            <a:r>
+              <a:rPr lang="en-US" sz="4900" dirty="0">
+                <a:solidFill>
+                  <a:schemeClr val="tx1"/>
+                </a:solidFill>
+                <a:cs typeface="Segoe UI" panose="020B0502040204020203" pitchFamily="34" charset="0"/>
+              </a:rPr>
+              <a:t>Common scenarios</a:t>
+            </a:r>
+            <a:br>
+              <a:rPr lang="en-US" dirty="0">
+                <a:solidFill>
+                  <a:schemeClr val="tx1"/>
+                </a:solidFill>
+                <a:latin typeface="Segoe UI" panose="020B0502040204020203" pitchFamily="34" charset="0"/>
+              </a:rPr>
+            </a:br>
+            <a:endParaRPr lang="en-US" sz="3236" dirty="0">
+              <a:solidFill>
+                <a:schemeClr val="tx1"/>
+              </a:solidFill>
+              <a:latin typeface="Segoe UI" panose="020B0502040204020203" pitchFamily="34" charset="0"/>
+            </a:endParaRPr>
+          </a:p>
+        </p:txBody>
+      </p:sp>
+      <p:sp>
+        <p:nvSpPr>
+          <p:cNvPr id="3" name="Content Placeholder 2"/>
+          <p:cNvSpPr>
+            <a:spLocks noGrp="1"/>
+          </p:cNvSpPr>
+          <p:nvPr>
+            <p:ph type="body" sz="quarter" idx="10"/>
+          </p:nvPr>
+        </p:nvSpPr>
+        <p:spPr/>
+        <p:txBody>
+          <a:bodyPr>
+            <a:normAutofit/>
+          </a:bodyPr>
+          <a:lstStyle/>
+          <a:p>
+            <a:pPr marL="0" indent="0">
+              <a:buNone/>
+            </a:pPr>
+            <a:r>
+              <a:rPr lang="en-US" sz="3600" dirty="0">
+                <a:solidFill>
+                  <a:schemeClr val="tx1"/>
+                </a:solidFill>
+                <a:latin typeface="+mj-lt"/>
+              </a:rPr>
+              <a:t>Kubernetes Architecture</a:t>
+            </a:r>
+            <a:endParaRPr lang="en-US" sz="1800" dirty="0">
+              <a:solidFill>
+                <a:schemeClr val="tx1"/>
+              </a:solidFill>
+            </a:endParaRPr>
+          </a:p>
+        </p:txBody>
+      </p:sp>
+      <p:pic>
+        <p:nvPicPr>
+          <p:cNvPr id="4" name="Picture 3">
+            <a:extLst>
+              <a:ext uri="{FF2B5EF4-FFF2-40B4-BE49-F238E27FC236}">
+                <a16:creationId xmlns:a16="http://schemas.microsoft.com/office/drawing/2014/main" id="{3C5B1B49-16A0-6D47-86C1-375B65B64B2C}"/>
+              </a:ext>
+            </a:extLst>
+          </p:cNvPr>
+          <p:cNvPicPr>
+            <a:picLocks noChangeAspect="1"/>
+          </p:cNvPicPr>
+          <p:nvPr/>
+        </p:nvPicPr>
+        <p:blipFill>
+          <a:blip r:embed="rId3"/>
+          <a:stretch>
+            <a:fillRect/>
+          </a:stretch>
+        </p:blipFill>
+        <p:spPr>
+          <a:xfrm>
+            <a:off x="882396" y="2274287"/>
+            <a:ext cx="10744200" cy="3683000"/>
+          </a:xfrm>
+          <a:prstGeom prst="rect">
+            <a:avLst/>
+          </a:prstGeom>
+        </p:spPr>
+      </p:pic>
+    </p:spTree>
+    <p:extLst>
+      <p:ext uri="{BB962C8B-B14F-4D97-AF65-F5344CB8AC3E}">
+        <p14:creationId xmlns:p14="http://schemas.microsoft.com/office/powerpoint/2010/main" val="3705119090"/>
+      </p:ext>
+    </p:extLst>
+  </p:cSld>
+  <p:clrMapOvr>
+    <a:masterClrMapping/>
+  </p:clrMapOvr>
+  <mc:AlternateContent xmlns:mc="http://schemas.openxmlformats.org/markup-compatibility/2006" xmlns:p14="http://schemas.microsoft.com/office/powerpoint/2010/main">
+    <mc:Choice Requires="p14">
+      <p:transition p14:dur="0"/>
+    </mc:Choice>
+    <mc:Fallback xmlns="">
+      <p:transition/>
+    </mc:Fallback>
+  </mc:AlternateContent>
+</p:sld>
+</file>
+
 <file path=ppt/slides/slide13.xml><?xml version="1.0" encoding="utf-8"?>
 <p:sld xmlns:a="http://schemas.openxmlformats.org/drawingml/2006/main" xmlns:r="http://schemas.openxmlformats.org/officeDocument/2006/relationships" xmlns:p="http://schemas.openxmlformats.org/presentationml/2006/main">
   <p:cSld>
@@ -15749,163 +15593,6 @@
       </p:sp>
       <p:sp>
         <p:nvSpPr>
-          <p:cNvPr id="3" name="Content Placeholder 2"/>
-          <p:cNvSpPr>
-            <a:spLocks noGrp="1"/>
-          </p:cNvSpPr>
-          <p:nvPr>
-            <p:ph type="body" sz="quarter" idx="10"/>
-          </p:nvPr>
-        </p:nvSpPr>
-        <p:spPr/>
-        <p:txBody>
-          <a:bodyPr>
-            <a:normAutofit/>
-          </a:bodyPr>
-          <a:lstStyle/>
-          <a:p>
-            <a:pPr marL="0" indent="0">
-              <a:buNone/>
-            </a:pPr>
-            <a:r>
-              <a:rPr lang="en-US" sz="3600" dirty="0">
-                <a:solidFill>
-                  <a:schemeClr val="tx1"/>
-                </a:solidFill>
-                <a:latin typeface="+mj-lt"/>
-              </a:rPr>
-              <a:t>Kubernetes Architecture</a:t>
-            </a:r>
-            <a:endParaRPr lang="en-US" sz="1800" dirty="0">
-              <a:solidFill>
-                <a:schemeClr val="tx1"/>
-              </a:solidFill>
-            </a:endParaRPr>
-          </a:p>
-        </p:txBody>
-      </p:sp>
-      <p:pic>
-        <p:nvPicPr>
-          <p:cNvPr id="5" name="Picture 4" descr="A diagram of a Kubernetes cluster topology illustrating master and agent nodes with load balancers. ">
-            <a:extLst>
-              <a:ext uri="{FF2B5EF4-FFF2-40B4-BE49-F238E27FC236}">
-                <a16:creationId xmlns:a16="http://schemas.microsoft.com/office/drawing/2014/main" id="{7AEFFEC0-5207-4451-B522-B0D07BE0B68B}"/>
-              </a:ext>
-            </a:extLst>
-          </p:cNvPr>
-          <p:cNvPicPr/>
-          <p:nvPr/>
-        </p:nvPicPr>
-        <p:blipFill>
-          <a:blip r:embed="rId3">
-            <a:extLst>
-              <a:ext uri="{28A0092B-C50C-407E-A947-70E740481C1C}">
-                <a14:useLocalDpi xmlns:a14="http://schemas.microsoft.com/office/drawing/2010/main" val="0"/>
-              </a:ext>
-            </a:extLst>
-          </a:blip>
-          <a:srcRect/>
-          <a:stretch>
-            <a:fillRect/>
-          </a:stretch>
-        </p:blipFill>
-        <p:spPr bwMode="auto">
-          <a:xfrm>
-            <a:off x="838199" y="1995466"/>
-            <a:ext cx="10084267" cy="3818105"/>
-          </a:xfrm>
-          <a:prstGeom prst="rect">
-            <a:avLst/>
-          </a:prstGeom>
-          <a:noFill/>
-          <a:ln>
-            <a:noFill/>
-          </a:ln>
-        </p:spPr>
-      </p:pic>
-    </p:spTree>
-    <p:extLst>
-      <p:ext uri="{BB962C8B-B14F-4D97-AF65-F5344CB8AC3E}">
-        <p14:creationId xmlns:p14="http://schemas.microsoft.com/office/powerpoint/2010/main" val="3705119090"/>
-      </p:ext>
-    </p:extLst>
-  </p:cSld>
-  <p:clrMapOvr>
-    <a:masterClrMapping/>
-  </p:clrMapOvr>
-  <mc:AlternateContent xmlns:mc="http://schemas.openxmlformats.org/markup-compatibility/2006" xmlns:p14="http://schemas.microsoft.com/office/powerpoint/2010/main">
-    <mc:Choice Requires="p14">
-      <p:transition p14:dur="0"/>
-    </mc:Choice>
-    <mc:Fallback xmlns="">
-      <p:transition/>
-    </mc:Fallback>
-  </mc:AlternateContent>
-</p:sld>
-</file>
-
-<file path=ppt/slides/slide14.xml><?xml version="1.0" encoding="utf-8"?>
-<p:sld xmlns:a="http://schemas.openxmlformats.org/drawingml/2006/main" xmlns:r="http://schemas.openxmlformats.org/officeDocument/2006/relationships" xmlns:p="http://schemas.openxmlformats.org/presentationml/2006/main">
-  <p:cSld>
-    <p:spTree>
-      <p:nvGrpSpPr>
-        <p:cNvPr id="1" name=""/>
-        <p:cNvGrpSpPr/>
-        <p:nvPr/>
-      </p:nvGrpSpPr>
-      <p:grpSpPr>
-        <a:xfrm>
-          <a:off x="0" y="0"/>
-          <a:ext cx="0" cy="0"/>
-          <a:chOff x="0" y="0"/>
-          <a:chExt cx="0" cy="0"/>
-        </a:xfrm>
-      </p:grpSpPr>
-      <p:sp>
-        <p:nvSpPr>
-          <p:cNvPr id="2" name="Title 1"/>
-          <p:cNvSpPr>
-            <a:spLocks noGrp="1"/>
-          </p:cNvSpPr>
-          <p:nvPr>
-            <p:ph type="title"/>
-          </p:nvPr>
-        </p:nvSpPr>
-        <p:spPr/>
-        <p:txBody>
-          <a:bodyPr>
-            <a:normAutofit fontScale="90000"/>
-          </a:bodyPr>
-          <a:lstStyle/>
-          <a:p>
-            <a:r>
-              <a:rPr lang="en-US" sz="4900" dirty="0">
-                <a:solidFill>
-                  <a:schemeClr val="tx1"/>
-                </a:solidFill>
-                <a:cs typeface="Segoe UI" panose="020B0502040204020203" pitchFamily="34" charset="0"/>
-              </a:rPr>
-              <a:t>Common scenarios</a:t>
-            </a:r>
-            <a:br>
-              <a:rPr lang="en-US" dirty="0">
-                <a:solidFill>
-                  <a:schemeClr val="tx1"/>
-                </a:solidFill>
-                <a:latin typeface="Segoe UI" panose="020B0502040204020203" pitchFamily="34" charset="0"/>
-              </a:rPr>
-            </a:br>
-            <a:endParaRPr lang="en-US" sz="3236" dirty="0">
-              <a:solidFill>
-                <a:schemeClr val="tx1"/>
-              </a:solidFill>
-              <a:latin typeface="Segoe UI" panose="020B0502040204020203" pitchFamily="34" charset="0"/>
-            </a:endParaRPr>
-          </a:p>
-        </p:txBody>
-      </p:sp>
-      <p:sp>
-        <p:nvSpPr>
           <p:cNvPr id="3" name="Content Placeholder 2" descr="Chef Server schematic. Showing nodes.  and Aministrators workstation, and cloud provisioning requests." title="Chef Automate Servier with Azure"/>
           <p:cNvSpPr>
             <a:spLocks noGrp="1"/>
@@ -15938,10 +15625,10 @@
       </p:sp>
       <p:pic>
         <p:nvPicPr>
-          <p:cNvPr id="4" name="Picture 3" descr="A diagram showing the Azure DevOps workflow to build Docker images from source code, push images to Azure Container Registry, and deploy to Azure Container Service using Kubernetes, Swarm or DCOS.">
+          <p:cNvPr id="5" name="Picture 4">
             <a:extLst>
               <a:ext uri="{FF2B5EF4-FFF2-40B4-BE49-F238E27FC236}">
-                <a16:creationId xmlns:a16="http://schemas.microsoft.com/office/drawing/2014/main" id="{0305F324-4B77-45E3-80FB-814D71A1C0AE}"/>
+                <a16:creationId xmlns:a16="http://schemas.microsoft.com/office/drawing/2014/main" id="{0AD41684-79B1-1641-996F-2A9ECFAA44F5}"/>
               </a:ext>
             </a:extLst>
           </p:cNvPr>
@@ -15958,8 +15645,8 @@
         </p:blipFill>
         <p:spPr>
           <a:xfrm>
-            <a:off x="2220743" y="1866588"/>
-            <a:ext cx="7230398" cy="4701901"/>
+            <a:off x="2682240" y="1855424"/>
+            <a:ext cx="6627914" cy="5002576"/>
           </a:xfrm>
           <a:prstGeom prst="rect">
             <a:avLst/>
@@ -15987,7 +15674,7 @@
 </p:sld>
 </file>
 
-<file path=ppt/slides/slide15.xml><?xml version="1.0" encoding="utf-8"?>
+<file path=ppt/slides/slide14.xml><?xml version="1.0" encoding="utf-8"?>
 <p:sld xmlns:a="http://schemas.openxmlformats.org/drawingml/2006/main" xmlns:r="http://schemas.openxmlformats.org/officeDocument/2006/relationships" xmlns:p="http://schemas.openxmlformats.org/presentationml/2006/main">
   <p:cSld>
     <p:spTree>
@@ -16537,6 +16224,310 @@
 </p:sld>
 </file>
 
+<file path=ppt/slides/slide15.xml><?xml version="1.0" encoding="utf-8"?>
+<p:sld xmlns:a="http://schemas.openxmlformats.org/drawingml/2006/main" xmlns:r="http://schemas.openxmlformats.org/officeDocument/2006/relationships" xmlns:p="http://schemas.openxmlformats.org/presentationml/2006/main">
+  <p:cSld>
+    <p:spTree>
+      <p:nvGrpSpPr>
+        <p:cNvPr id="1" name=""/>
+        <p:cNvGrpSpPr/>
+        <p:nvPr/>
+      </p:nvGrpSpPr>
+      <p:grpSpPr>
+        <a:xfrm>
+          <a:off x="0" y="0"/>
+          <a:ext cx="0" cy="0"/>
+          <a:chOff x="0" y="0"/>
+          <a:chExt cx="0" cy="0"/>
+        </a:xfrm>
+      </p:grpSpPr>
+      <p:sp>
+        <p:nvSpPr>
+          <p:cNvPr id="2" name="Title 1"/>
+          <p:cNvSpPr>
+            <a:spLocks noGrp="1"/>
+          </p:cNvSpPr>
+          <p:nvPr>
+            <p:ph type="title"/>
+          </p:nvPr>
+        </p:nvSpPr>
+        <p:spPr/>
+        <p:txBody>
+          <a:bodyPr>
+            <a:normAutofit/>
+          </a:bodyPr>
+          <a:lstStyle/>
+          <a:p>
+            <a:r>
+              <a:rPr lang="en-US" sz="4400" dirty="0">
+                <a:solidFill>
+                  <a:schemeClr val="tx1"/>
+                </a:solidFill>
+                <a:latin typeface="Segoe UI Light" panose="020B0502040204020203" pitchFamily="34" charset="0"/>
+                <a:cs typeface="Segoe UI Light" panose="020B0502040204020203" pitchFamily="34" charset="0"/>
+              </a:rPr>
+              <a:t>Step 3: Present the solution</a:t>
+            </a:r>
+          </a:p>
+        </p:txBody>
+      </p:sp>
+      <p:sp>
+        <p:nvSpPr>
+          <p:cNvPr id="9" name="TextBox 8">
+            <a:extLst>
+              <a:ext uri="{FF2B5EF4-FFF2-40B4-BE49-F238E27FC236}">
+                <a16:creationId xmlns:a16="http://schemas.microsoft.com/office/drawing/2014/main" id="{0F86F9F9-39B5-4CE6-AF48-9ADAE40EA728}"/>
+              </a:ext>
+            </a:extLst>
+          </p:cNvPr>
+          <p:cNvSpPr txBox="1"/>
+          <p:nvPr/>
+        </p:nvSpPr>
+        <p:spPr>
+          <a:xfrm>
+            <a:off x="340285" y="1062166"/>
+            <a:ext cx="11472487" cy="5672322"/>
+          </a:xfrm>
+          <a:prstGeom prst="rect">
+            <a:avLst/>
+          </a:prstGeom>
+          <a:noFill/>
+        </p:spPr>
+        <p:txBody>
+          <a:bodyPr wrap="square" lIns="182880" tIns="146304" rIns="182880" bIns="146304" rtlCol="0">
+            <a:spAutoFit/>
+          </a:bodyPr>
+          <a:lstStyle/>
+          <a:p>
+            <a:pPr>
+              <a:lnSpc>
+                <a:spcPct val="90000"/>
+              </a:lnSpc>
+              <a:spcAft>
+                <a:spcPts val="600"/>
+              </a:spcAft>
+            </a:pPr>
+            <a:r>
+              <a:rPr lang="en-US" sz="3600" dirty="0">
+                <a:latin typeface="+mj-lt"/>
+              </a:rPr>
+              <a:t>Outcome</a:t>
+            </a:r>
+          </a:p>
+          <a:p>
+            <a:pPr>
+              <a:lnSpc>
+                <a:spcPct val="90000"/>
+              </a:lnSpc>
+              <a:spcAft>
+                <a:spcPts val="600"/>
+              </a:spcAft>
+            </a:pPr>
+            <a:r>
+              <a:rPr lang="en-US" sz="2400" dirty="0">
+                <a:latin typeface="Segoe UI Semilight" panose="020B0402040204020203" pitchFamily="34" charset="0"/>
+                <a:cs typeface="Segoe UI Semilight" panose="020B0402040204020203" pitchFamily="34" charset="0"/>
+              </a:rPr>
+              <a:t>Prepare to present a solution to the target customer in a 15-minute chalk-talk format </a:t>
+            </a:r>
+            <a:endParaRPr lang="en-US" sz="3600" dirty="0">
+              <a:latin typeface="+mj-lt"/>
+            </a:endParaRPr>
+          </a:p>
+          <a:p>
+            <a:pPr>
+              <a:lnSpc>
+                <a:spcPct val="90000"/>
+              </a:lnSpc>
+              <a:spcAft>
+                <a:spcPts val="600"/>
+              </a:spcAft>
+            </a:pPr>
+            <a:endParaRPr lang="en-US" dirty="0">
+              <a:latin typeface="+mj-lt"/>
+            </a:endParaRPr>
+          </a:p>
+          <a:p>
+            <a:pPr>
+              <a:lnSpc>
+                <a:spcPct val="90000"/>
+              </a:lnSpc>
+              <a:spcAft>
+                <a:spcPts val="600"/>
+              </a:spcAft>
+            </a:pPr>
+            <a:r>
+              <a:rPr lang="en-US" sz="3600" dirty="0">
+                <a:latin typeface="+mj-lt"/>
+              </a:rPr>
+              <a:t>Timeframe</a:t>
+            </a:r>
+          </a:p>
+          <a:p>
+            <a:pPr>
+              <a:lnSpc>
+                <a:spcPct val="90000"/>
+              </a:lnSpc>
+              <a:spcAft>
+                <a:spcPts val="600"/>
+              </a:spcAft>
+            </a:pPr>
+            <a:r>
+              <a:rPr lang="en-US" sz="2400" dirty="0">
+                <a:latin typeface="Segoe UI Semilight" panose="020B0402040204020203" pitchFamily="34" charset="0"/>
+                <a:cs typeface="Segoe UI Semilight" panose="020B0402040204020203" pitchFamily="34" charset="0"/>
+              </a:rPr>
+              <a:t>30 minutes (15 minutes for each team to present and receive feedback) </a:t>
+            </a:r>
+          </a:p>
+          <a:p>
+            <a:pPr>
+              <a:lnSpc>
+                <a:spcPct val="90000"/>
+              </a:lnSpc>
+              <a:spcAft>
+                <a:spcPts val="600"/>
+              </a:spcAft>
+            </a:pPr>
+            <a:endParaRPr lang="en-US" dirty="0">
+              <a:latin typeface="+mj-lt"/>
+            </a:endParaRPr>
+          </a:p>
+          <a:p>
+            <a:pPr>
+              <a:lnSpc>
+                <a:spcPct val="90000"/>
+              </a:lnSpc>
+              <a:spcAft>
+                <a:spcPts val="600"/>
+              </a:spcAft>
+            </a:pPr>
+            <a:r>
+              <a:rPr lang="en-US" sz="3600" dirty="0">
+                <a:latin typeface="+mj-lt"/>
+              </a:rPr>
+              <a:t>Directions</a:t>
+            </a:r>
+          </a:p>
+          <a:p>
+            <a:pPr marL="342900" lvl="0" indent="-342900">
+              <a:buFont typeface="Arial" panose="020B0604020202020204" pitchFamily="34" charset="0"/>
+              <a:buChar char="•"/>
+            </a:pPr>
+            <a:r>
+              <a:rPr lang="en-US" sz="2000" dirty="0">
+                <a:latin typeface="Segoe UI Semilight" panose="020B0402040204020203" pitchFamily="34" charset="0"/>
+                <a:cs typeface="Segoe UI Semilight" panose="020B0402040204020203" pitchFamily="34" charset="0"/>
+              </a:rPr>
+              <a:t>Pair with another table</a:t>
+            </a:r>
+          </a:p>
+          <a:p>
+            <a:pPr marL="342900" lvl="0" indent="-342900">
+              <a:buFont typeface="Arial" panose="020B0604020202020204" pitchFamily="34" charset="0"/>
+              <a:buChar char="•"/>
+            </a:pPr>
+            <a:r>
+              <a:rPr lang="en-US" sz="2000" dirty="0">
+                <a:latin typeface="Segoe UI Semilight" panose="020B0402040204020203" pitchFamily="34" charset="0"/>
+                <a:cs typeface="Segoe UI Semilight" panose="020B0402040204020203" pitchFamily="34" charset="0"/>
+              </a:rPr>
+              <a:t>One table is the Microsoft team and the other table is the customer</a:t>
+            </a:r>
+          </a:p>
+          <a:p>
+            <a:pPr marL="342900" lvl="0" indent="-342900">
+              <a:buFont typeface="Arial" panose="020B0604020202020204" pitchFamily="34" charset="0"/>
+              <a:buChar char="•"/>
+            </a:pPr>
+            <a:r>
+              <a:rPr lang="en-US" sz="2000" dirty="0">
+                <a:latin typeface="Segoe UI Semilight" panose="020B0402040204020203" pitchFamily="34" charset="0"/>
+                <a:cs typeface="Segoe UI Semilight" panose="020B0402040204020203" pitchFamily="34" charset="0"/>
+              </a:rPr>
+              <a:t>The Microsoft team presents their proposed solution to the customer</a:t>
+            </a:r>
+          </a:p>
+          <a:p>
+            <a:pPr marL="342900" lvl="0" indent="-342900">
+              <a:buFont typeface="Arial" panose="020B0604020202020204" pitchFamily="34" charset="0"/>
+              <a:buChar char="•"/>
+            </a:pPr>
+            <a:r>
+              <a:rPr lang="en-US" sz="2000" dirty="0">
+                <a:latin typeface="Segoe UI Semilight" panose="020B0402040204020203" pitchFamily="34" charset="0"/>
+                <a:cs typeface="Segoe UI Semilight" panose="020B0402040204020203" pitchFamily="34" charset="0"/>
+              </a:rPr>
+              <a:t>The customer asks one of the objections from the list of objections in the case study</a:t>
+            </a:r>
+          </a:p>
+          <a:p>
+            <a:pPr marL="342900" lvl="0" indent="-342900">
+              <a:buFont typeface="Arial" panose="020B0604020202020204" pitchFamily="34" charset="0"/>
+              <a:buChar char="•"/>
+            </a:pPr>
+            <a:r>
+              <a:rPr lang="en-US" sz="2000" dirty="0">
+                <a:latin typeface="Segoe UI Semilight" panose="020B0402040204020203" pitchFamily="34" charset="0"/>
+                <a:cs typeface="Segoe UI Semilight" panose="020B0402040204020203" pitchFamily="34" charset="0"/>
+              </a:rPr>
+              <a:t>The Microsoft team responds to the objection</a:t>
+            </a:r>
+          </a:p>
+          <a:p>
+            <a:pPr marL="342900" lvl="0" indent="-342900">
+              <a:buFont typeface="Arial" panose="020B0604020202020204" pitchFamily="34" charset="0"/>
+              <a:buChar char="•"/>
+            </a:pPr>
+            <a:r>
+              <a:rPr lang="en-US" sz="2000" dirty="0">
+                <a:latin typeface="Segoe UI Semilight" panose="020B0402040204020203" pitchFamily="34" charset="0"/>
+                <a:cs typeface="Segoe UI Semilight" panose="020B0402040204020203" pitchFamily="34" charset="0"/>
+              </a:rPr>
+              <a:t>The customer team gives feedback to the Microsoft team</a:t>
+            </a:r>
+            <a:endParaRPr lang="en-US" sz="2000" strike="sngStrike" dirty="0">
+              <a:latin typeface="Segoe UI Semilight" panose="020B0402040204020203" pitchFamily="34" charset="0"/>
+              <a:cs typeface="Segoe UI Semilight" panose="020B0402040204020203" pitchFamily="34" charset="0"/>
+            </a:endParaRPr>
+          </a:p>
+          <a:p>
+            <a:pPr>
+              <a:lnSpc>
+                <a:spcPct val="90000"/>
+              </a:lnSpc>
+              <a:spcAft>
+                <a:spcPts val="600"/>
+              </a:spcAft>
+            </a:pPr>
+            <a:endParaRPr lang="en-US" sz="2400" dirty="0">
+              <a:latin typeface="Segoe UI Semilight" panose="020B0402040204020203" pitchFamily="34" charset="0"/>
+              <a:cs typeface="Segoe UI Semilight" panose="020B0402040204020203" pitchFamily="34" charset="0"/>
+            </a:endParaRPr>
+          </a:p>
+        </p:txBody>
+      </p:sp>
+    </p:spTree>
+    <p:extLst>
+      <p:ext uri="{BB962C8B-B14F-4D97-AF65-F5344CB8AC3E}">
+        <p14:creationId xmlns:p14="http://schemas.microsoft.com/office/powerpoint/2010/main" val="3717261927"/>
+      </p:ext>
+    </p:extLst>
+  </p:cSld>
+  <p:clrMapOvr>
+    <a:masterClrMapping/>
+  </p:clrMapOvr>
+  <mc:AlternateContent xmlns:mc="http://schemas.openxmlformats.org/markup-compatibility/2006" xmlns:p14="http://schemas.microsoft.com/office/powerpoint/2010/main">
+    <mc:Choice Requires="p14">
+      <p:transition p14:dur="0"/>
+    </mc:Choice>
+    <mc:Fallback xmlns="">
+      <p:transition/>
+    </mc:Fallback>
+  </mc:AlternateContent>
+</p:sld>
+</file>
+
 <file path=ppt/slides/slide16.xml><?xml version="1.0" encoding="utf-8"?>
 <p:sld xmlns:a="http://schemas.openxmlformats.org/drawingml/2006/main" xmlns:r="http://schemas.openxmlformats.org/officeDocument/2006/relationships" xmlns:p="http://schemas.openxmlformats.org/presentationml/2006/main">
   <p:cSld>
@@ -16579,310 +16570,6 @@
                 <a:latin typeface="Segoe UI Light" panose="020B0502040204020203" pitchFamily="34" charset="0"/>
                 <a:cs typeface="Segoe UI Light" panose="020B0502040204020203" pitchFamily="34" charset="0"/>
               </a:rPr>
-              <a:t>Step 3: Present the solution</a:t>
-            </a:r>
-          </a:p>
-        </p:txBody>
-      </p:sp>
-      <p:sp>
-        <p:nvSpPr>
-          <p:cNvPr id="9" name="TextBox 8">
-            <a:extLst>
-              <a:ext uri="{FF2B5EF4-FFF2-40B4-BE49-F238E27FC236}">
-                <a16:creationId xmlns:a16="http://schemas.microsoft.com/office/drawing/2014/main" id="{0F86F9F9-39B5-4CE6-AF48-9ADAE40EA728}"/>
-              </a:ext>
-            </a:extLst>
-          </p:cNvPr>
-          <p:cNvSpPr txBox="1"/>
-          <p:nvPr/>
-        </p:nvSpPr>
-        <p:spPr>
-          <a:xfrm>
-            <a:off x="340285" y="1062166"/>
-            <a:ext cx="11472487" cy="5672322"/>
-          </a:xfrm>
-          <a:prstGeom prst="rect">
-            <a:avLst/>
-          </a:prstGeom>
-          <a:noFill/>
-        </p:spPr>
-        <p:txBody>
-          <a:bodyPr wrap="square" lIns="182880" tIns="146304" rIns="182880" bIns="146304" rtlCol="0">
-            <a:spAutoFit/>
-          </a:bodyPr>
-          <a:lstStyle/>
-          <a:p>
-            <a:pPr>
-              <a:lnSpc>
-                <a:spcPct val="90000"/>
-              </a:lnSpc>
-              <a:spcAft>
-                <a:spcPts val="600"/>
-              </a:spcAft>
-            </a:pPr>
-            <a:r>
-              <a:rPr lang="en-US" sz="3600" dirty="0">
-                <a:latin typeface="+mj-lt"/>
-              </a:rPr>
-              <a:t>Outcome</a:t>
-            </a:r>
-          </a:p>
-          <a:p>
-            <a:pPr>
-              <a:lnSpc>
-                <a:spcPct val="90000"/>
-              </a:lnSpc>
-              <a:spcAft>
-                <a:spcPts val="600"/>
-              </a:spcAft>
-            </a:pPr>
-            <a:r>
-              <a:rPr lang="en-US" sz="2400" dirty="0">
-                <a:latin typeface="Segoe UI Semilight" panose="020B0402040204020203" pitchFamily="34" charset="0"/>
-                <a:cs typeface="Segoe UI Semilight" panose="020B0402040204020203" pitchFamily="34" charset="0"/>
-              </a:rPr>
-              <a:t>Prepare to present a solution to the target customer in a 15-minute chalk-talk format </a:t>
-            </a:r>
-            <a:endParaRPr lang="en-US" sz="3600" dirty="0">
-              <a:latin typeface="+mj-lt"/>
-            </a:endParaRPr>
-          </a:p>
-          <a:p>
-            <a:pPr>
-              <a:lnSpc>
-                <a:spcPct val="90000"/>
-              </a:lnSpc>
-              <a:spcAft>
-                <a:spcPts val="600"/>
-              </a:spcAft>
-            </a:pPr>
-            <a:endParaRPr lang="en-US" dirty="0">
-              <a:latin typeface="+mj-lt"/>
-            </a:endParaRPr>
-          </a:p>
-          <a:p>
-            <a:pPr>
-              <a:lnSpc>
-                <a:spcPct val="90000"/>
-              </a:lnSpc>
-              <a:spcAft>
-                <a:spcPts val="600"/>
-              </a:spcAft>
-            </a:pPr>
-            <a:r>
-              <a:rPr lang="en-US" sz="3600" dirty="0">
-                <a:latin typeface="+mj-lt"/>
-              </a:rPr>
-              <a:t>Timeframe</a:t>
-            </a:r>
-          </a:p>
-          <a:p>
-            <a:pPr>
-              <a:lnSpc>
-                <a:spcPct val="90000"/>
-              </a:lnSpc>
-              <a:spcAft>
-                <a:spcPts val="600"/>
-              </a:spcAft>
-            </a:pPr>
-            <a:r>
-              <a:rPr lang="en-US" sz="2400" dirty="0">
-                <a:latin typeface="Segoe UI Semilight" panose="020B0402040204020203" pitchFamily="34" charset="0"/>
-                <a:cs typeface="Segoe UI Semilight" panose="020B0402040204020203" pitchFamily="34" charset="0"/>
-              </a:rPr>
-              <a:t>30 minutes (15 minutes for each team to present and receive feedback) </a:t>
-            </a:r>
-          </a:p>
-          <a:p>
-            <a:pPr>
-              <a:lnSpc>
-                <a:spcPct val="90000"/>
-              </a:lnSpc>
-              <a:spcAft>
-                <a:spcPts val="600"/>
-              </a:spcAft>
-            </a:pPr>
-            <a:endParaRPr lang="en-US" dirty="0">
-              <a:latin typeface="+mj-lt"/>
-            </a:endParaRPr>
-          </a:p>
-          <a:p>
-            <a:pPr>
-              <a:lnSpc>
-                <a:spcPct val="90000"/>
-              </a:lnSpc>
-              <a:spcAft>
-                <a:spcPts val="600"/>
-              </a:spcAft>
-            </a:pPr>
-            <a:r>
-              <a:rPr lang="en-US" sz="3600" dirty="0">
-                <a:latin typeface="+mj-lt"/>
-              </a:rPr>
-              <a:t>Directions</a:t>
-            </a:r>
-          </a:p>
-          <a:p>
-            <a:pPr marL="342900" lvl="0" indent="-342900">
-              <a:buFont typeface="Arial" panose="020B0604020202020204" pitchFamily="34" charset="0"/>
-              <a:buChar char="•"/>
-            </a:pPr>
-            <a:r>
-              <a:rPr lang="en-US" sz="2000" dirty="0">
-                <a:latin typeface="Segoe UI Semilight" panose="020B0402040204020203" pitchFamily="34" charset="0"/>
-                <a:cs typeface="Segoe UI Semilight" panose="020B0402040204020203" pitchFamily="34" charset="0"/>
-              </a:rPr>
-              <a:t>Pair with another table</a:t>
-            </a:r>
-          </a:p>
-          <a:p>
-            <a:pPr marL="342900" lvl="0" indent="-342900">
-              <a:buFont typeface="Arial" panose="020B0604020202020204" pitchFamily="34" charset="0"/>
-              <a:buChar char="•"/>
-            </a:pPr>
-            <a:r>
-              <a:rPr lang="en-US" sz="2000" dirty="0">
-                <a:latin typeface="Segoe UI Semilight" panose="020B0402040204020203" pitchFamily="34" charset="0"/>
-                <a:cs typeface="Segoe UI Semilight" panose="020B0402040204020203" pitchFamily="34" charset="0"/>
-              </a:rPr>
-              <a:t>One table is the Microsoft team and the other table is the customer</a:t>
-            </a:r>
-          </a:p>
-          <a:p>
-            <a:pPr marL="342900" lvl="0" indent="-342900">
-              <a:buFont typeface="Arial" panose="020B0604020202020204" pitchFamily="34" charset="0"/>
-              <a:buChar char="•"/>
-            </a:pPr>
-            <a:r>
-              <a:rPr lang="en-US" sz="2000" dirty="0">
-                <a:latin typeface="Segoe UI Semilight" panose="020B0402040204020203" pitchFamily="34" charset="0"/>
-                <a:cs typeface="Segoe UI Semilight" panose="020B0402040204020203" pitchFamily="34" charset="0"/>
-              </a:rPr>
-              <a:t>The Microsoft team presents their proposed solution to the customer</a:t>
-            </a:r>
-          </a:p>
-          <a:p>
-            <a:pPr marL="342900" lvl="0" indent="-342900">
-              <a:buFont typeface="Arial" panose="020B0604020202020204" pitchFamily="34" charset="0"/>
-              <a:buChar char="•"/>
-            </a:pPr>
-            <a:r>
-              <a:rPr lang="en-US" sz="2000" dirty="0">
-                <a:latin typeface="Segoe UI Semilight" panose="020B0402040204020203" pitchFamily="34" charset="0"/>
-                <a:cs typeface="Segoe UI Semilight" panose="020B0402040204020203" pitchFamily="34" charset="0"/>
-              </a:rPr>
-              <a:t>The customer asks one of the objections from the list of objections in the case study</a:t>
-            </a:r>
-          </a:p>
-          <a:p>
-            <a:pPr marL="342900" lvl="0" indent="-342900">
-              <a:buFont typeface="Arial" panose="020B0604020202020204" pitchFamily="34" charset="0"/>
-              <a:buChar char="•"/>
-            </a:pPr>
-            <a:r>
-              <a:rPr lang="en-US" sz="2000" dirty="0">
-                <a:latin typeface="Segoe UI Semilight" panose="020B0402040204020203" pitchFamily="34" charset="0"/>
-                <a:cs typeface="Segoe UI Semilight" panose="020B0402040204020203" pitchFamily="34" charset="0"/>
-              </a:rPr>
-              <a:t>The Microsoft team responds to the objection</a:t>
-            </a:r>
-          </a:p>
-          <a:p>
-            <a:pPr marL="342900" lvl="0" indent="-342900">
-              <a:buFont typeface="Arial" panose="020B0604020202020204" pitchFamily="34" charset="0"/>
-              <a:buChar char="•"/>
-            </a:pPr>
-            <a:r>
-              <a:rPr lang="en-US" sz="2000" dirty="0">
-                <a:latin typeface="Segoe UI Semilight" panose="020B0402040204020203" pitchFamily="34" charset="0"/>
-                <a:cs typeface="Segoe UI Semilight" panose="020B0402040204020203" pitchFamily="34" charset="0"/>
-              </a:rPr>
-              <a:t>The customer team gives feedback to the Microsoft team</a:t>
-            </a:r>
-            <a:endParaRPr lang="en-US" sz="2000" strike="sngStrike" dirty="0">
-              <a:latin typeface="Segoe UI Semilight" panose="020B0402040204020203" pitchFamily="34" charset="0"/>
-              <a:cs typeface="Segoe UI Semilight" panose="020B0402040204020203" pitchFamily="34" charset="0"/>
-            </a:endParaRPr>
-          </a:p>
-          <a:p>
-            <a:pPr>
-              <a:lnSpc>
-                <a:spcPct val="90000"/>
-              </a:lnSpc>
-              <a:spcAft>
-                <a:spcPts val="600"/>
-              </a:spcAft>
-            </a:pPr>
-            <a:endParaRPr lang="en-US" sz="2400" dirty="0">
-              <a:latin typeface="Segoe UI Semilight" panose="020B0402040204020203" pitchFamily="34" charset="0"/>
-              <a:cs typeface="Segoe UI Semilight" panose="020B0402040204020203" pitchFamily="34" charset="0"/>
-            </a:endParaRPr>
-          </a:p>
-        </p:txBody>
-      </p:sp>
-    </p:spTree>
-    <p:extLst>
-      <p:ext uri="{BB962C8B-B14F-4D97-AF65-F5344CB8AC3E}">
-        <p14:creationId xmlns:p14="http://schemas.microsoft.com/office/powerpoint/2010/main" val="3717261927"/>
-      </p:ext>
-    </p:extLst>
-  </p:cSld>
-  <p:clrMapOvr>
-    <a:masterClrMapping/>
-  </p:clrMapOvr>
-  <mc:AlternateContent xmlns:mc="http://schemas.openxmlformats.org/markup-compatibility/2006" xmlns:p14="http://schemas.microsoft.com/office/powerpoint/2010/main">
-    <mc:Choice Requires="p14">
-      <p:transition p14:dur="0"/>
-    </mc:Choice>
-    <mc:Fallback xmlns="">
-      <p:transition/>
-    </mc:Fallback>
-  </mc:AlternateContent>
-</p:sld>
-</file>
-
-<file path=ppt/slides/slide17.xml><?xml version="1.0" encoding="utf-8"?>
-<p:sld xmlns:a="http://schemas.openxmlformats.org/drawingml/2006/main" xmlns:r="http://schemas.openxmlformats.org/officeDocument/2006/relationships" xmlns:p="http://schemas.openxmlformats.org/presentationml/2006/main">
-  <p:cSld>
-    <p:spTree>
-      <p:nvGrpSpPr>
-        <p:cNvPr id="1" name=""/>
-        <p:cNvGrpSpPr/>
-        <p:nvPr/>
-      </p:nvGrpSpPr>
-      <p:grpSpPr>
-        <a:xfrm>
-          <a:off x="0" y="0"/>
-          <a:ext cx="0" cy="0"/>
-          <a:chOff x="0" y="0"/>
-          <a:chExt cx="0" cy="0"/>
-        </a:xfrm>
-      </p:grpSpPr>
-      <p:sp>
-        <p:nvSpPr>
-          <p:cNvPr id="2" name="Title 1"/>
-          <p:cNvSpPr>
-            <a:spLocks noGrp="1"/>
-          </p:cNvSpPr>
-          <p:nvPr>
-            <p:ph type="title"/>
-          </p:nvPr>
-        </p:nvSpPr>
-        <p:spPr/>
-        <p:txBody>
-          <a:bodyPr>
-            <a:normAutofit/>
-          </a:bodyPr>
-          <a:lstStyle/>
-          <a:p>
-            <a:r>
-              <a:rPr lang="en-US" sz="4400" dirty="0">
-                <a:solidFill>
-                  <a:schemeClr val="tx1"/>
-                </a:solidFill>
-                <a:latin typeface="Segoe UI Light" panose="020B0502040204020203" pitchFamily="34" charset="0"/>
-                <a:cs typeface="Segoe UI Light" panose="020B0502040204020203" pitchFamily="34" charset="0"/>
-              </a:rPr>
               <a:t>Wrap-up</a:t>
             </a:r>
           </a:p>
@@ -17032,7 +16719,7 @@
 </p:sld>
 </file>
 
-<file path=ppt/slides/slide18.xml><?xml version="1.0" encoding="utf-8"?>
+<file path=ppt/slides/slide17.xml><?xml version="1.0" encoding="utf-8"?>
 <p:sld xmlns:a="http://schemas.openxmlformats.org/drawingml/2006/main" xmlns:r="http://schemas.openxmlformats.org/officeDocument/2006/relationships" xmlns:p="http://schemas.openxmlformats.org/presentationml/2006/main">
   <p:cSld>
     <p:bg>
@@ -17233,7 +16920,7 @@
 </p:sld>
 </file>
 
-<file path=ppt/slides/slide19.xml><?xml version="1.0" encoding="utf-8"?>
+<file path=ppt/slides/slide18.xml><?xml version="1.0" encoding="utf-8"?>
 <p:sld xmlns:a="http://schemas.openxmlformats.org/drawingml/2006/main" xmlns:r="http://schemas.openxmlformats.org/officeDocument/2006/relationships" xmlns:p="http://schemas.openxmlformats.org/presentationml/2006/main">
   <p:cSld>
     <p:spTree>
@@ -17357,6 +17044,117 @@
     <p:extLst>
       <p:ext uri="{BB962C8B-B14F-4D97-AF65-F5344CB8AC3E}">
         <p14:creationId xmlns:p14="http://schemas.microsoft.com/office/powerpoint/2010/main" val="2547985055"/>
+      </p:ext>
+    </p:extLst>
+  </p:cSld>
+  <p:clrMapOvr>
+    <a:masterClrMapping/>
+  </p:clrMapOvr>
+  <mc:AlternateContent xmlns:mc="http://schemas.openxmlformats.org/markup-compatibility/2006" xmlns:p14="http://schemas.microsoft.com/office/powerpoint/2010/main">
+    <mc:Choice Requires="p14">
+      <p:transition p14:dur="0"/>
+    </mc:Choice>
+    <mc:Fallback xmlns="">
+      <p:transition/>
+    </mc:Fallback>
+  </mc:AlternateContent>
+</p:sld>
+</file>
+
+<file path=ppt/slides/slide19.xml><?xml version="1.0" encoding="utf-8"?>
+<p:sld xmlns:a="http://schemas.openxmlformats.org/drawingml/2006/main" xmlns:r="http://schemas.openxmlformats.org/officeDocument/2006/relationships" xmlns:p="http://schemas.openxmlformats.org/presentationml/2006/main">
+  <p:cSld>
+    <p:spTree>
+      <p:nvGrpSpPr>
+        <p:cNvPr id="1" name=""/>
+        <p:cNvGrpSpPr/>
+        <p:nvPr/>
+      </p:nvGrpSpPr>
+      <p:grpSpPr>
+        <a:xfrm>
+          <a:off x="0" y="0"/>
+          <a:ext cx="0" cy="0"/>
+          <a:chOff x="0" y="0"/>
+          <a:chExt cx="0" cy="0"/>
+        </a:xfrm>
+      </p:grpSpPr>
+      <p:sp>
+        <p:nvSpPr>
+          <p:cNvPr id="2" name="Title 1"/>
+          <p:cNvSpPr>
+            <a:spLocks noGrp="1"/>
+          </p:cNvSpPr>
+          <p:nvPr>
+            <p:ph type="title"/>
+          </p:nvPr>
+        </p:nvSpPr>
+        <p:spPr/>
+        <p:txBody>
+          <a:bodyPr>
+            <a:normAutofit fontScale="90000"/>
+          </a:bodyPr>
+          <a:lstStyle/>
+          <a:p>
+            <a:r>
+              <a:rPr lang="en-US" sz="4900" dirty="0">
+                <a:solidFill>
+                  <a:schemeClr val="tx1"/>
+                </a:solidFill>
+                <a:cs typeface="Segoe UI" panose="020B0502040204020203" pitchFamily="34" charset="0"/>
+              </a:rPr>
+              <a:t>Preferred solution</a:t>
+            </a:r>
+            <a:br>
+              <a:rPr lang="en-US" dirty="0">
+                <a:solidFill>
+                  <a:schemeClr val="tx1"/>
+                </a:solidFill>
+                <a:latin typeface="Segoe UI" panose="020B0502040204020203" pitchFamily="34" charset="0"/>
+              </a:rPr>
+            </a:br>
+            <a:endParaRPr lang="en-US" sz="3236" dirty="0">
+              <a:solidFill>
+                <a:schemeClr val="tx1"/>
+              </a:solidFill>
+              <a:latin typeface="Segoe UI" panose="020B0502040204020203" pitchFamily="34" charset="0"/>
+            </a:endParaRPr>
+          </a:p>
+        </p:txBody>
+      </p:sp>
+      <p:pic>
+        <p:nvPicPr>
+          <p:cNvPr id="4" name="Picture 3" descr="A diagram showing the solution, using Azure Kubernetes Service with a CosmosDB back end.">
+            <a:extLst>
+              <a:ext uri="{FF2B5EF4-FFF2-40B4-BE49-F238E27FC236}">
+                <a16:creationId xmlns:a16="http://schemas.microsoft.com/office/drawing/2014/main" id="{A77DE13A-AD2C-4759-A6A4-111012127BDB}"/>
+              </a:ext>
+            </a:extLst>
+          </p:cNvPr>
+          <p:cNvPicPr>
+            <a:picLocks noChangeAspect="1"/>
+          </p:cNvPicPr>
+          <p:nvPr/>
+        </p:nvPicPr>
+        <p:blipFill>
+          <a:blip r:embed="rId3"/>
+          <a:stretch>
+            <a:fillRect/>
+          </a:stretch>
+        </p:blipFill>
+        <p:spPr>
+          <a:xfrm>
+            <a:off x="1715911" y="1369575"/>
+            <a:ext cx="9014287" cy="5352957"/>
+          </a:xfrm>
+          <a:prstGeom prst="rect">
+            <a:avLst/>
+          </a:prstGeom>
+        </p:spPr>
+      </p:pic>
+    </p:spTree>
+    <p:extLst>
+      <p:ext uri="{BB962C8B-B14F-4D97-AF65-F5344CB8AC3E}">
+        <p14:creationId xmlns:p14="http://schemas.microsoft.com/office/powerpoint/2010/main" val="2077532963"/>
       </p:ext>
     </p:extLst>
   </p:cSld>
@@ -17647,6 +17445,65 @@
       </p:grpSpPr>
       <p:sp>
         <p:nvSpPr>
+          <p:cNvPr id="3" name="Content Placeholder 2"/>
+          <p:cNvSpPr>
+            <a:spLocks noGrp="1"/>
+          </p:cNvSpPr>
+          <p:nvPr>
+            <p:ph type="body" sz="quarter" idx="10"/>
+          </p:nvPr>
+        </p:nvSpPr>
+        <p:spPr>
+          <a:xfrm>
+            <a:off x="269239" y="1189176"/>
+            <a:ext cx="11653523" cy="5287823"/>
+          </a:xfrm>
+        </p:spPr>
+        <p:txBody>
+          <a:bodyPr>
+            <a:normAutofit/>
+          </a:bodyPr>
+          <a:lstStyle/>
+          <a:p>
+            <a:pPr marL="0" indent="0">
+              <a:buNone/>
+            </a:pPr>
+            <a:r>
+              <a:rPr lang="en-US" sz="3600" dirty="0"/>
+              <a:t>With so many platforms and tools for Docker and container orchestration, how should we choose an option for Azure?</a:t>
+            </a:r>
+          </a:p>
+          <a:p>
+            <a:pPr marL="0" indent="0">
+              <a:buNone/>
+            </a:pPr>
+            <a:endParaRPr lang="en-US" sz="2000" i="1" dirty="0"/>
+          </a:p>
+          <a:p>
+            <a:pPr lvl="2"/>
+            <a:r>
+              <a:rPr lang="en-US" sz="2800" dirty="0"/>
+              <a:t>App Service for Containers – simple, PaaS without robust orchestration platform management tooling</a:t>
+            </a:r>
+          </a:p>
+          <a:p>
+            <a:pPr lvl="2"/>
+            <a:r>
+              <a:rPr lang="en-US" sz="2800" dirty="0"/>
+              <a:t>Azure Container Instances – simple, isolated, without management tooling</a:t>
+            </a:r>
+          </a:p>
+          <a:p>
+            <a:pPr lvl="2"/>
+            <a:r>
+              <a:rPr lang="en-US" sz="2800" dirty="0"/>
+              <a:t>Azure Kubernetes Services (AKS) – the ideal solution for a fully managed experience</a:t>
+            </a:r>
+          </a:p>
+        </p:txBody>
+      </p:sp>
+      <p:sp>
+        <p:nvSpPr>
           <p:cNvPr id="2" name="Title 1"/>
           <p:cNvSpPr>
             <a:spLocks noGrp="1"/>
@@ -17669,7 +17526,7 @@
                 </a:solidFill>
                 <a:cs typeface="Segoe UI" panose="020B0502040204020203" pitchFamily="34" charset="0"/>
               </a:rPr>
-              <a:t>Preferred solution</a:t>
+              <a:t>Preferred objections handling</a:t>
             </a:r>
             <a:br>
               <a:rPr lang="en-US" dirty="0">
@@ -17688,40 +17545,10 @@
           </a:p>
         </p:txBody>
       </p:sp>
-      <p:pic>
-        <p:nvPicPr>
-          <p:cNvPr id="4" name="Picture 3" descr="A diagram showing the solution, using Azure Kubernetes Service with a CosmosDB back end.">
-            <a:extLst>
-              <a:ext uri="{FF2B5EF4-FFF2-40B4-BE49-F238E27FC236}">
-                <a16:creationId xmlns:a16="http://schemas.microsoft.com/office/drawing/2014/main" id="{A77DE13A-AD2C-4759-A6A4-111012127BDB}"/>
-              </a:ext>
-            </a:extLst>
-          </p:cNvPr>
-          <p:cNvPicPr>
-            <a:picLocks noChangeAspect="1"/>
-          </p:cNvPicPr>
-          <p:nvPr/>
-        </p:nvPicPr>
-        <p:blipFill>
-          <a:blip r:embed="rId3"/>
-          <a:stretch>
-            <a:fillRect/>
-          </a:stretch>
-        </p:blipFill>
-        <p:spPr>
-          <a:xfrm>
-            <a:off x="1715911" y="1369575"/>
-            <a:ext cx="9014287" cy="5352957"/>
-          </a:xfrm>
-          <a:prstGeom prst="rect">
-            <a:avLst/>
-          </a:prstGeom>
-        </p:spPr>
-      </p:pic>
     </p:spTree>
     <p:extLst>
       <p:ext uri="{BB962C8B-B14F-4D97-AF65-F5344CB8AC3E}">
-        <p14:creationId xmlns:p14="http://schemas.microsoft.com/office/powerpoint/2010/main" val="2077532963"/>
+        <p14:creationId xmlns:p14="http://schemas.microsoft.com/office/powerpoint/2010/main" val="2371438961"/>
       </p:ext>
     </p:extLst>
   </p:cSld>
@@ -17768,8 +17595,8 @@
         </p:nvSpPr>
         <p:spPr>
           <a:xfrm>
-            <a:off x="269239" y="1189176"/>
-            <a:ext cx="11653523" cy="5287823"/>
+            <a:off x="269240" y="1444357"/>
+            <a:ext cx="10416482" cy="5287823"/>
           </a:xfrm>
         </p:spPr>
         <p:txBody>
@@ -17787,27 +17614,16 @@
             </a:r>
           </a:p>
           <a:p>
-            <a:endParaRPr lang="en-US" sz="2000" i="1" dirty="0"/>
+            <a:pPr marL="0" indent="0">
+              <a:buNone/>
+            </a:pPr>
+            <a:endParaRPr lang="en-US" sz="1800" i="1" dirty="0"/>
           </a:p>
           <a:p>
             <a:pPr lvl="2"/>
             <a:r>
               <a:rPr lang="en-US" sz="2800" dirty="0"/>
-              <a:t>App Service for Containers – simple, PaaS without robust orchestration platform management tooling</a:t>
-            </a:r>
-          </a:p>
-          <a:p>
-            <a:pPr lvl="2"/>
-            <a:r>
-              <a:rPr lang="en-US" sz="2800" dirty="0"/>
-              <a:t>Azure Container Instances – simple, isolated, without management tooling</a:t>
-            </a:r>
-          </a:p>
-          <a:p>
-            <a:pPr lvl="2"/>
-            <a:r>
-              <a:rPr lang="en-US" sz="2800" dirty="0"/>
-              <a:t>Azure Kubernetes Services (AKS) – the ideal solution for a fully managed experience</a:t>
+              <a:t>The best option is to go with a managed cluster such as Azure Container Service (AKS), native to Azure</a:t>
             </a:r>
           </a:p>
         </p:txBody>
@@ -17858,7 +17674,7 @@
     </p:spTree>
     <p:extLst>
       <p:ext uri="{BB962C8B-B14F-4D97-AF65-F5344CB8AC3E}">
-        <p14:creationId xmlns:p14="http://schemas.microsoft.com/office/powerpoint/2010/main" val="2371438961"/>
+        <p14:creationId xmlns:p14="http://schemas.microsoft.com/office/powerpoint/2010/main" val="3409696839"/>
       </p:ext>
     </p:extLst>
   </p:cSld>
@@ -17905,129 +17721,6 @@
         </p:nvSpPr>
         <p:spPr>
           <a:xfrm>
-            <a:off x="269240" y="1444357"/>
-            <a:ext cx="10416482" cy="5287823"/>
-          </a:xfrm>
-        </p:spPr>
-        <p:txBody>
-          <a:bodyPr>
-            <a:normAutofit/>
-          </a:bodyPr>
-          <a:lstStyle/>
-          <a:p>
-            <a:pPr marL="0" indent="0">
-              <a:buNone/>
-            </a:pPr>
-            <a:r>
-              <a:rPr lang="en-US" sz="3600" dirty="0"/>
-              <a:t>With so many platforms and tools for Docker and container orchestration, how should we choose an option for Azure?</a:t>
-            </a:r>
-          </a:p>
-          <a:p>
-            <a:endParaRPr lang="en-US" sz="1800" i="1" dirty="0"/>
-          </a:p>
-          <a:p>
-            <a:pPr lvl="2"/>
-            <a:r>
-              <a:rPr lang="en-US" sz="2800" dirty="0"/>
-              <a:t>The best option is to go with a managed cluster such as Azure Container Service (AKS), native to Azure</a:t>
-            </a:r>
-          </a:p>
-        </p:txBody>
-      </p:sp>
-      <p:sp>
-        <p:nvSpPr>
-          <p:cNvPr id="2" name="Title 1"/>
-          <p:cNvSpPr>
-            <a:spLocks noGrp="1"/>
-          </p:cNvSpPr>
-          <p:nvPr>
-            <p:ph type="title"/>
-          </p:nvPr>
-        </p:nvSpPr>
-        <p:spPr/>
-        <p:txBody>
-          <a:bodyPr>
-            <a:normAutofit fontScale="90000"/>
-          </a:bodyPr>
-          <a:lstStyle/>
-          <a:p>
-            <a:r>
-              <a:rPr lang="en-US" sz="4900" dirty="0">
-                <a:solidFill>
-                  <a:schemeClr val="tx1"/>
-                </a:solidFill>
-                <a:cs typeface="Segoe UI" panose="020B0502040204020203" pitchFamily="34" charset="0"/>
-              </a:rPr>
-              <a:t>Preferred objections handling</a:t>
-            </a:r>
-            <a:br>
-              <a:rPr lang="en-US" dirty="0">
-                <a:solidFill>
-                  <a:schemeClr val="tx1"/>
-                </a:solidFill>
-                <a:latin typeface="Segoe UI" panose="020B0502040204020203" pitchFamily="34" charset="0"/>
-              </a:rPr>
-            </a:br>
-            <a:endParaRPr lang="en-US" sz="3236" dirty="0">
-              <a:solidFill>
-                <a:schemeClr val="tx1"/>
-              </a:solidFill>
-              <a:latin typeface="Segoe UI" panose="020B0502040204020203" pitchFamily="34" charset="0"/>
-            </a:endParaRPr>
-          </a:p>
-        </p:txBody>
-      </p:sp>
-    </p:spTree>
-    <p:extLst>
-      <p:ext uri="{BB962C8B-B14F-4D97-AF65-F5344CB8AC3E}">
-        <p14:creationId xmlns:p14="http://schemas.microsoft.com/office/powerpoint/2010/main" val="3409696839"/>
-      </p:ext>
-    </p:extLst>
-  </p:cSld>
-  <p:clrMapOvr>
-    <a:masterClrMapping/>
-  </p:clrMapOvr>
-  <mc:AlternateContent xmlns:mc="http://schemas.openxmlformats.org/markup-compatibility/2006" xmlns:p14="http://schemas.microsoft.com/office/powerpoint/2010/main">
-    <mc:Choice Requires="p14">
-      <p:transition p14:dur="0"/>
-    </mc:Choice>
-    <mc:Fallback xmlns="">
-      <p:transition/>
-    </mc:Fallback>
-  </mc:AlternateContent>
-</p:sld>
-</file>
-
-<file path=ppt/slides/slide23.xml><?xml version="1.0" encoding="utf-8"?>
-<p:sld xmlns:a="http://schemas.openxmlformats.org/drawingml/2006/main" xmlns:r="http://schemas.openxmlformats.org/officeDocument/2006/relationships" xmlns:p="http://schemas.openxmlformats.org/presentationml/2006/main">
-  <p:cSld>
-    <p:spTree>
-      <p:nvGrpSpPr>
-        <p:cNvPr id="1" name=""/>
-        <p:cNvGrpSpPr/>
-        <p:nvPr/>
-      </p:nvGrpSpPr>
-      <p:grpSpPr>
-        <a:xfrm>
-          <a:off x="0" y="0"/>
-          <a:ext cx="0" cy="0"/>
-          <a:chOff x="0" y="0"/>
-          <a:chExt cx="0" cy="0"/>
-        </a:xfrm>
-      </p:grpSpPr>
-      <p:sp>
-        <p:nvSpPr>
-          <p:cNvPr id="3" name="Content Placeholder 2"/>
-          <p:cNvSpPr>
-            <a:spLocks noGrp="1"/>
-          </p:cNvSpPr>
-          <p:nvPr>
-            <p:ph type="body" sz="quarter" idx="10"/>
-          </p:nvPr>
-        </p:nvSpPr>
-        <p:spPr>
-          <a:xfrm>
             <a:off x="266920" y="2157140"/>
             <a:ext cx="11653523" cy="2792889"/>
           </a:xfrm>
@@ -18186,7 +17879,7 @@
 </p:sld>
 </file>
 
-<file path=ppt/slides/slide24.xml><?xml version="1.0" encoding="utf-8"?>
+<file path=ppt/slides/slide23.xml><?xml version="1.0" encoding="utf-8"?>
 <p:sld xmlns:a="http://schemas.openxmlformats.org/drawingml/2006/main" xmlns:r="http://schemas.openxmlformats.org/officeDocument/2006/relationships" xmlns:p="http://schemas.openxmlformats.org/presentationml/2006/main">
   <p:cSld>
     <p:bg>
@@ -18922,29 +18615,14 @@
             <a:pPr lvl="1"/>
             <a:r>
               <a:rPr lang="en-US" sz="2800" b="1" dirty="0"/>
-              <a:t>Conference sites are currently hosted in Azure </a:t>
+              <a:t>Conference sites are currently hosted on Windows Server machines on premise</a:t>
             </a:r>
           </a:p>
           <a:p>
             <a:pPr lvl="1" fontAlgn="base"/>
             <a:r>
               <a:rPr lang="en-US" sz="2800" b="1" dirty="0"/>
-              <a:t>Web applications and APIs hosted in Azure App Services</a:t>
-            </a:r>
-          </a:p>
-          <a:p>
-            <a:pPr lvl="1" fontAlgn="base"/>
-            <a:r>
-              <a:rPr lang="en-US" sz="2800" b="1" dirty="0"/>
-              <a:t>MongoDB is a managed service provided by </a:t>
-            </a:r>
-            <a:r>
-              <a:rPr lang="en-US" sz="2800" b="1" dirty="0" err="1"/>
-              <a:t>mLab</a:t>
-            </a:r>
-            <a:r>
-              <a:rPr lang="en-US" sz="2800" b="1" dirty="0"/>
-              <a:t> on Azure</a:t>
+              <a:t>The data back-end is a MongoDB cluster also deployed to Windows Server machines on premise</a:t>
             </a:r>
           </a:p>
         </p:txBody>
@@ -19086,7 +18764,7 @@
             <a:pPr lvl="2" fontAlgn="base"/>
             <a:r>
               <a:rPr lang="en-US" sz="2400" b="1" dirty="0"/>
-              <a:t>The tenant’s code is deployed to the App Service Plan (VM)</a:t>
+              <a:t>The tenant’s code is deployed to a specific group of load balanced Windows Server machines dedicated to one or more tenant</a:t>
             </a:r>
           </a:p>
           <a:p>
@@ -19187,6 +18865,52 @@
           <a:chExt cx="0" cy="0"/>
         </a:xfrm>
       </p:grpSpPr>
+      <p:pic>
+        <p:nvPicPr>
+          <p:cNvPr id="4" name="Graphic 3" descr="Speech icon">
+            <a:extLst>
+              <a:ext uri="{FF2B5EF4-FFF2-40B4-BE49-F238E27FC236}">
+                <a16:creationId xmlns:a16="http://schemas.microsoft.com/office/drawing/2014/main" id="{475009F3-F585-BA45-A864-378F7513E5C5}"/>
+              </a:ext>
+            </a:extLst>
+          </p:cNvPr>
+          <p:cNvPicPr>
+            <a:picLocks noChangeAspect="1"/>
+          </p:cNvPicPr>
+          <p:nvPr/>
+        </p:nvPicPr>
+        <p:blipFill>
+          <a:blip r:embed="rId3">
+            <a:extLst>
+              <a:ext uri="{28A0092B-C50C-407E-A947-70E740481C1C}">
+                <a14:useLocalDpi xmlns:a14="http://schemas.microsoft.com/office/drawing/2010/main" val="0"/>
+              </a:ext>
+              <a:ext uri="{96DAC541-7B7A-43D3-8B79-37D633B846F1}">
+                <asvg:svgBlip xmlns:asvg="http://schemas.microsoft.com/office/drawing/2016/SVG/main" r:embed="rId4"/>
+              </a:ext>
+            </a:extLst>
+          </a:blip>
+          <a:stretch>
+            <a:fillRect/>
+          </a:stretch>
+        </p:blipFill>
+        <p:spPr>
+          <a:xfrm>
+            <a:off x="8518775" y="4852416"/>
+            <a:ext cx="3403986" cy="2005584"/>
+          </a:xfrm>
+          <a:prstGeom prst="rect">
+            <a:avLst/>
+          </a:prstGeom>
+          <a:effectLst>
+            <a:outerShdw blurRad="76200" dir="18900000" sy="23000" kx="-1200000" algn="bl" rotWithShape="0">
+              <a:prstClr val="black">
+                <a:alpha val="20000"/>
+              </a:prstClr>
+            </a:outerShdw>
+          </a:effectLst>
+        </p:spPr>
+      </p:pic>
       <p:sp>
         <p:nvSpPr>
           <p:cNvPr id="3" name="Content Placeholder 2"/>

</xml_diff>